<commit_message>
JS Classes - Lab
</commit_message>
<xml_diff>
--- a/JS-Core/JS_Advanced/07_JS-Classes/07. Js-Classes.pptx
+++ b/JS-Core/JS_Advanced/07_JS-Classes/07. Js-Classes.pptx
@@ -215,7 +215,7 @@
       </p14:sectionLst>
     </p:ext>
     <p:ext uri="{EFAFB233-063F-42B5-8137-9DF3F51BA10A}">
-      <p15:sldGuideLst xmlns:p15="http://schemas.microsoft.com/office/powerpoint/2012/main" xmlns="">
+      <p15:sldGuideLst xmlns="" xmlns:p15="http://schemas.microsoft.com/office/powerpoint/2012/main">
         <p15:guide id="1" orient="horz" pos="2228" userDrawn="1">
           <p15:clr>
             <a:srgbClr val="A4A3A4"/>
@@ -229,7 +229,7 @@
       </p15:sldGuideLst>
     </p:ext>
     <p:ext uri="{2D200454-40CA-4A62-9FC3-DE9A4176ACB9}">
-      <p15:notesGuideLst xmlns:p15="http://schemas.microsoft.com/office/powerpoint/2012/main" xmlns=""/>
+      <p15:notesGuideLst xmlns="" xmlns:p15="http://schemas.microsoft.com/office/powerpoint/2012/main"/>
     </p:ext>
   </p:extLst>
 </p:presentation>
@@ -262,7 +262,7 @@
           <p:cNvPr id="2" name="Header Placeholder 1">
             <a:extLst>
               <a:ext uri="{FF2B5EF4-FFF2-40B4-BE49-F238E27FC236}">
-                <a16:creationId xmlns:a16="http://schemas.microsoft.com/office/drawing/2014/main" xmlns="" id="{56F20103-83CC-4A54-8FDE-9D37FC2629C0}"/>
+                <a16:creationId xmlns="" xmlns:a16="http://schemas.microsoft.com/office/drawing/2014/main" id="{56F20103-83CC-4A54-8FDE-9D37FC2629C0}"/>
               </a:ext>
             </a:extLst>
           </p:cNvPr>
@@ -299,7 +299,7 @@
           <p:cNvPr id="3" name="Date Placeholder 2">
             <a:extLst>
               <a:ext uri="{FF2B5EF4-FFF2-40B4-BE49-F238E27FC236}">
-                <a16:creationId xmlns:a16="http://schemas.microsoft.com/office/drawing/2014/main" xmlns="" id="{27A53962-26EF-44E4-9E69-61B1727AB1C2}"/>
+                <a16:creationId xmlns="" xmlns:a16="http://schemas.microsoft.com/office/drawing/2014/main" id="{27A53962-26EF-44E4-9E69-61B1727AB1C2}"/>
               </a:ext>
             </a:extLst>
           </p:cNvPr>
@@ -329,7 +329,7 @@
           <a:p>
             <a:fld id="{4E087215-0C8F-4762-A664-737A353EC9A4}" type="datetimeFigureOut">
               <a:rPr lang="bg-BG" smtClean="0"/>
-              <a:t>18.9.2018 г.</a:t>
+              <a:t>2.11.2018 г.</a:t>
             </a:fld>
             <a:endParaRPr lang="bg-BG"/>
           </a:p>
@@ -340,7 +340,7 @@
           <p:cNvPr id="4" name="Footer Placeholder 3">
             <a:extLst>
               <a:ext uri="{FF2B5EF4-FFF2-40B4-BE49-F238E27FC236}">
-                <a16:creationId xmlns:a16="http://schemas.microsoft.com/office/drawing/2014/main" xmlns="" id="{28A6967E-448F-4887-8FCB-34482EFBCC74}"/>
+                <a16:creationId xmlns="" xmlns:a16="http://schemas.microsoft.com/office/drawing/2014/main" id="{28A6967E-448F-4887-8FCB-34482EFBCC74}"/>
               </a:ext>
             </a:extLst>
           </p:cNvPr>
@@ -377,7 +377,7 @@
           <p:cNvPr id="5" name="Slide Number Placeholder 4">
             <a:extLst>
               <a:ext uri="{FF2B5EF4-FFF2-40B4-BE49-F238E27FC236}">
-                <a16:creationId xmlns:a16="http://schemas.microsoft.com/office/drawing/2014/main" xmlns="" id="{8B6554C2-DDBA-40E2-9536-53A07EC50274}"/>
+                <a16:creationId xmlns="" xmlns:a16="http://schemas.microsoft.com/office/drawing/2014/main" id="{8B6554C2-DDBA-40E2-9536-53A07EC50274}"/>
               </a:ext>
             </a:extLst>
           </p:cNvPr>
@@ -506,7 +506,7 @@
           <a:p>
             <a:fld id="{72D84649-876A-46C9-8472-14CB09C070D8}" type="datetimeFigureOut">
               <a:rPr lang="en-US" smtClean="0"/>
-              <a:t>9/18/2018</a:t>
+              <a:t>11/2/2018</a:t>
             </a:fld>
             <a:endParaRPr lang="en-US" dirty="0"/>
           </a:p>
@@ -2013,7 +2013,7 @@
           <p:cNvPr id="17" name="Picture 16">
             <a:extLst>
               <a:ext uri="{FF2B5EF4-FFF2-40B4-BE49-F238E27FC236}">
-                <a16:creationId xmlns:a16="http://schemas.microsoft.com/office/drawing/2014/main" xmlns="" id="{5B5A345C-2CD0-4932-A998-37B2D20BF028}"/>
+                <a16:creationId xmlns="" xmlns:a16="http://schemas.microsoft.com/office/drawing/2014/main" id="{5B5A345C-2CD0-4932-A998-37B2D20BF028}"/>
               </a:ext>
             </a:extLst>
           </p:cNvPr>
@@ -2042,7 +2042,7 @@
           <p:cNvPr id="33" name="Picture Placeholder 32">
             <a:extLst>
               <a:ext uri="{FF2B5EF4-FFF2-40B4-BE49-F238E27FC236}">
-                <a16:creationId xmlns:a16="http://schemas.microsoft.com/office/drawing/2014/main" xmlns="" id="{A04D819A-89E2-4714-8C56-1838BF467EF7}"/>
+                <a16:creationId xmlns="" xmlns:a16="http://schemas.microsoft.com/office/drawing/2014/main" id="{A04D819A-89E2-4714-8C56-1838BF467EF7}"/>
               </a:ext>
             </a:extLst>
           </p:cNvPr>
@@ -2084,7 +2084,7 @@
           <p:cNvPr id="35" name="Picture 34">
             <a:extLst>
               <a:ext uri="{FF2B5EF4-FFF2-40B4-BE49-F238E27FC236}">
-                <a16:creationId xmlns:a16="http://schemas.microsoft.com/office/drawing/2014/main" xmlns="" id="{951E7DA9-C5F0-43D9-B013-3BDF9EEF029D}"/>
+                <a16:creationId xmlns="" xmlns:a16="http://schemas.microsoft.com/office/drawing/2014/main" id="{951E7DA9-C5F0-43D9-B013-3BDF9EEF029D}"/>
               </a:ext>
             </a:extLst>
           </p:cNvPr>
@@ -2119,7 +2119,7 @@
           <p:cNvPr id="43" name="Subtitle 5">
             <a:extLst>
               <a:ext uri="{FF2B5EF4-FFF2-40B4-BE49-F238E27FC236}">
-                <a16:creationId xmlns:a16="http://schemas.microsoft.com/office/drawing/2014/main" xmlns="" id="{37BDB812-1395-4B02-ABCF-6A331EEE23E5}"/>
+                <a16:creationId xmlns="" xmlns:a16="http://schemas.microsoft.com/office/drawing/2014/main" id="{37BDB812-1395-4B02-ABCF-6A331EEE23E5}"/>
               </a:ext>
             </a:extLst>
           </p:cNvPr>
@@ -2167,7 +2167,7 @@
           <p:cNvPr id="19" name="Picture 18">
             <a:extLst>
               <a:ext uri="{FF2B5EF4-FFF2-40B4-BE49-F238E27FC236}">
-                <a16:creationId xmlns:a16="http://schemas.microsoft.com/office/drawing/2014/main" xmlns="" id="{4FAEB7CD-FF73-4344-9FE5-589B30F5AAF7}"/>
+                <a16:creationId xmlns="" xmlns:a16="http://schemas.microsoft.com/office/drawing/2014/main" id="{4FAEB7CD-FF73-4344-9FE5-589B30F5AAF7}"/>
               </a:ext>
             </a:extLst>
           </p:cNvPr>
@@ -2203,7 +2203,7 @@
           <p:cNvPr id="10" name="Picture 9">
             <a:extLst>
               <a:ext uri="{FF2B5EF4-FFF2-40B4-BE49-F238E27FC236}">
-                <a16:creationId xmlns:a16="http://schemas.microsoft.com/office/drawing/2014/main" xmlns="" id="{82DFEC2C-38C6-405B-AD0A-06879C50EFEE}"/>
+                <a16:creationId xmlns="" xmlns:a16="http://schemas.microsoft.com/office/drawing/2014/main" id="{82DFEC2C-38C6-405B-AD0A-06879C50EFEE}"/>
               </a:ext>
             </a:extLst>
           </p:cNvPr>
@@ -2238,7 +2238,7 @@
           <p:cNvPr id="15" name="Picture 14">
             <a:extLst>
               <a:ext uri="{FF2B5EF4-FFF2-40B4-BE49-F238E27FC236}">
-                <a16:creationId xmlns:a16="http://schemas.microsoft.com/office/drawing/2014/main" xmlns="" id="{D7483B54-1DD1-4FC4-9FA0-4872F8C409C8}"/>
+                <a16:creationId xmlns="" xmlns:a16="http://schemas.microsoft.com/office/drawing/2014/main" id="{D7483B54-1DD1-4FC4-9FA0-4872F8C409C8}"/>
               </a:ext>
             </a:extLst>
           </p:cNvPr>
@@ -2273,7 +2273,7 @@
           <p:cNvPr id="2" name="Title 1">
             <a:extLst>
               <a:ext uri="{FF2B5EF4-FFF2-40B4-BE49-F238E27FC236}">
-                <a16:creationId xmlns:a16="http://schemas.microsoft.com/office/drawing/2014/main" xmlns="" id="{A4DF3AB8-E6E3-4FCE-8A4A-ECD147720A5D}"/>
+                <a16:creationId xmlns="" xmlns:a16="http://schemas.microsoft.com/office/drawing/2014/main" id="{A4DF3AB8-E6E3-4FCE-8A4A-ECD147720A5D}"/>
               </a:ext>
             </a:extLst>
           </p:cNvPr>
@@ -2311,7 +2311,7 @@
             <a:hlinkClick r:id="rId7" tooltip="This work is licensed under the &quot;Creative Commons Attribution-NonCommercial-ShareAlike 4.0 International&quot; license"/>
             <a:extLst>
               <a:ext uri="{FF2B5EF4-FFF2-40B4-BE49-F238E27FC236}">
-                <a16:creationId xmlns:a16="http://schemas.microsoft.com/office/drawing/2014/main" xmlns="" id="{7CB336FF-A768-4CE1-B1CE-FC103B348EA1}"/>
+                <a16:creationId xmlns="" xmlns:a16="http://schemas.microsoft.com/office/drawing/2014/main" id="{7CB336FF-A768-4CE1-B1CE-FC103B348EA1}"/>
               </a:ext>
             </a:extLst>
           </p:cNvPr>
@@ -2364,7 +2364,7 @@
           <p:cNvPr id="30" name="Text Placeholder 13">
             <a:extLst>
               <a:ext uri="{FF2B5EF4-FFF2-40B4-BE49-F238E27FC236}">
-                <a16:creationId xmlns:a16="http://schemas.microsoft.com/office/drawing/2014/main" xmlns="" id="{2EA92DCA-4DB5-4D03-ACD3-A6A296592D0C}"/>
+                <a16:creationId xmlns="" xmlns:a16="http://schemas.microsoft.com/office/drawing/2014/main" id="{2EA92DCA-4DB5-4D03-ACD3-A6A296592D0C}"/>
               </a:ext>
             </a:extLst>
           </p:cNvPr>
@@ -2426,7 +2426,7 @@
           <p:cNvPr id="31" name="Text Placeholder 13">
             <a:extLst>
               <a:ext uri="{FF2B5EF4-FFF2-40B4-BE49-F238E27FC236}">
-                <a16:creationId xmlns:a16="http://schemas.microsoft.com/office/drawing/2014/main" xmlns="" id="{3E6B87B7-9D33-4EBB-BD4F-C0436BA3FD72}"/>
+                <a16:creationId xmlns="" xmlns:a16="http://schemas.microsoft.com/office/drawing/2014/main" id="{3E6B87B7-9D33-4EBB-BD4F-C0436BA3FD72}"/>
               </a:ext>
             </a:extLst>
           </p:cNvPr>
@@ -2488,7 +2488,7 @@
           <p:cNvPr id="36" name="Text Placeholder 13">
             <a:extLst>
               <a:ext uri="{FF2B5EF4-FFF2-40B4-BE49-F238E27FC236}">
-                <a16:creationId xmlns:a16="http://schemas.microsoft.com/office/drawing/2014/main" xmlns="" id="{3B21F47B-DE1F-442D-A2B7-6866F8786704}"/>
+                <a16:creationId xmlns="" xmlns:a16="http://schemas.microsoft.com/office/drawing/2014/main" id="{3B21F47B-DE1F-442D-A2B7-6866F8786704}"/>
               </a:ext>
             </a:extLst>
           </p:cNvPr>
@@ -2548,7 +2548,7 @@
           <p:cNvPr id="40" name="Text Placeholder 13">
             <a:extLst>
               <a:ext uri="{FF2B5EF4-FFF2-40B4-BE49-F238E27FC236}">
-                <a16:creationId xmlns:a16="http://schemas.microsoft.com/office/drawing/2014/main" xmlns="" id="{CD940256-851E-46C8-8BFB-A5ECA6C7DA07}"/>
+                <a16:creationId xmlns="" xmlns:a16="http://schemas.microsoft.com/office/drawing/2014/main" id="{CD940256-851E-46C8-8BFB-A5ECA6C7DA07}"/>
               </a:ext>
             </a:extLst>
           </p:cNvPr>
@@ -2608,7 +2608,7 @@
           <p:cNvPr id="16" name="Rectangle 15">
             <a:extLst>
               <a:ext uri="{FF2B5EF4-FFF2-40B4-BE49-F238E27FC236}">
-                <a16:creationId xmlns:a16="http://schemas.microsoft.com/office/drawing/2014/main" xmlns="" id="{6854D183-0374-4B3E-B2CE-32F308A81591}"/>
+                <a16:creationId xmlns="" xmlns:a16="http://schemas.microsoft.com/office/drawing/2014/main" id="{6854D183-0374-4B3E-B2CE-32F308A81591}"/>
               </a:ext>
             </a:extLst>
           </p:cNvPr>
@@ -2689,7 +2689,7 @@
           <p:cNvPr id="18" name="Rectangle 17">
             <a:extLst>
               <a:ext uri="{FF2B5EF4-FFF2-40B4-BE49-F238E27FC236}">
-                <a16:creationId xmlns:a16="http://schemas.microsoft.com/office/drawing/2014/main" xmlns="" id="{34E5CD64-8E62-478C-BD07-29B0AE8E261B}"/>
+                <a16:creationId xmlns="" xmlns:a16="http://schemas.microsoft.com/office/drawing/2014/main" id="{34E5CD64-8E62-478C-BD07-29B0AE8E261B}"/>
               </a:ext>
             </a:extLst>
           </p:cNvPr>
@@ -2786,7 +2786,7 @@
   <p:hf hdr="0" ftr="0" dt="0"/>
   <p:extLst mod="1">
     <p:ext uri="{DCECCB84-F9BA-43D5-87BE-67443E8EF086}">
-      <p15:sldGuideLst xmlns:p15="http://schemas.microsoft.com/office/powerpoint/2012/main" xmlns="">
+      <p15:sldGuideLst xmlns="" xmlns:p15="http://schemas.microsoft.com/office/powerpoint/2012/main">
         <p15:guide id="1" orient="horz" pos="2160">
           <p15:clr>
             <a:srgbClr val="FBAE40"/>
@@ -2825,7 +2825,7 @@
           <p:cNvPr id="11" name="Picture 10">
             <a:extLst>
               <a:ext uri="{FF2B5EF4-FFF2-40B4-BE49-F238E27FC236}">
-                <a16:creationId xmlns:a16="http://schemas.microsoft.com/office/drawing/2014/main" xmlns="" id="{23609A8D-9063-4A88-A094-81A65D7DF417}"/>
+                <a16:creationId xmlns="" xmlns:a16="http://schemas.microsoft.com/office/drawing/2014/main" id="{23609A8D-9063-4A88-A094-81A65D7DF417}"/>
               </a:ext>
             </a:extLst>
           </p:cNvPr>
@@ -2854,7 +2854,7 @@
           <p:cNvPr id="17" name="Rectangle 16">
             <a:extLst>
               <a:ext uri="{FF2B5EF4-FFF2-40B4-BE49-F238E27FC236}">
-                <a16:creationId xmlns:a16="http://schemas.microsoft.com/office/drawing/2014/main" xmlns="" id="{4880F1A8-532C-4443-BDB9-44438A972E15}"/>
+                <a16:creationId xmlns="" xmlns:a16="http://schemas.microsoft.com/office/drawing/2014/main" id="{4880F1A8-532C-4443-BDB9-44438A972E15}"/>
               </a:ext>
             </a:extLst>
           </p:cNvPr>
@@ -3164,7 +3164,7 @@
           <p:cNvPr id="10" name="Rectangle 9">
             <a:extLst>
               <a:ext uri="{FF2B5EF4-FFF2-40B4-BE49-F238E27FC236}">
-                <a16:creationId xmlns:a16="http://schemas.microsoft.com/office/drawing/2014/main" xmlns="" id="{E9B994EC-35A8-4A11-98CB-25DC28852F94}"/>
+                <a16:creationId xmlns="" xmlns:a16="http://schemas.microsoft.com/office/drawing/2014/main" id="{E9B994EC-35A8-4A11-98CB-25DC28852F94}"/>
               </a:ext>
             </a:extLst>
           </p:cNvPr>
@@ -3245,7 +3245,7 @@
           <p:cNvPr id="14" name="Text Placeholder 13">
             <a:extLst>
               <a:ext uri="{FF2B5EF4-FFF2-40B4-BE49-F238E27FC236}">
-                <a16:creationId xmlns:a16="http://schemas.microsoft.com/office/drawing/2014/main" xmlns="" id="{A2ABE920-240F-4CF6-AD45-23ED489FAD6E}"/>
+                <a16:creationId xmlns="" xmlns:a16="http://schemas.microsoft.com/office/drawing/2014/main" id="{A2ABE920-240F-4CF6-AD45-23ED489FAD6E}"/>
               </a:ext>
             </a:extLst>
           </p:cNvPr>
@@ -3308,7 +3308,7 @@
           <p:cNvPr id="6" name="Title 5">
             <a:extLst>
               <a:ext uri="{FF2B5EF4-FFF2-40B4-BE49-F238E27FC236}">
-                <a16:creationId xmlns:a16="http://schemas.microsoft.com/office/drawing/2014/main" xmlns="" id="{2FF342A0-26CC-4ADA-AB90-FC4810F88E91}"/>
+                <a16:creationId xmlns="" xmlns:a16="http://schemas.microsoft.com/office/drawing/2014/main" id="{2FF342A0-26CC-4ADA-AB90-FC4810F88E91}"/>
               </a:ext>
             </a:extLst>
           </p:cNvPr>
@@ -3344,7 +3344,7 @@
           <p:cNvPr id="8" name="Date Placeholder 7">
             <a:extLst>
               <a:ext uri="{FF2B5EF4-FFF2-40B4-BE49-F238E27FC236}">
-                <a16:creationId xmlns:a16="http://schemas.microsoft.com/office/drawing/2014/main" xmlns="" id="{A66184F8-77F5-4000-AA69-383B07AEEF0D}"/>
+                <a16:creationId xmlns="" xmlns:a16="http://schemas.microsoft.com/office/drawing/2014/main" id="{A66184F8-77F5-4000-AA69-383B07AEEF0D}"/>
               </a:ext>
             </a:extLst>
           </p:cNvPr>
@@ -3363,7 +3363,7 @@
             <a:fld id="{055373AC-9AA7-423B-BA00-BA1C74164DBD}" type="datetime1">
               <a:rPr lang="en-US" smtClean="0"/>
               <a:pPr/>
-              <a:t>9/18/2018</a:t>
+              <a:t>11/2/2018</a:t>
             </a:fld>
             <a:endParaRPr lang="en-US" dirty="0"/>
           </a:p>
@@ -3374,7 +3374,7 @@
           <p:cNvPr id="9" name="Footer Placeholder 8">
             <a:extLst>
               <a:ext uri="{FF2B5EF4-FFF2-40B4-BE49-F238E27FC236}">
-                <a16:creationId xmlns:a16="http://schemas.microsoft.com/office/drawing/2014/main" xmlns="" id="{9CAD63B7-3B55-42B3-B63C-7488630C399B}"/>
+                <a16:creationId xmlns="" xmlns:a16="http://schemas.microsoft.com/office/drawing/2014/main" id="{9CAD63B7-3B55-42B3-B63C-7488630C399B}"/>
               </a:ext>
             </a:extLst>
           </p:cNvPr>
@@ -3399,7 +3399,7 @@
           <p:cNvPr id="15" name="Slide Number Placeholder 14">
             <a:extLst>
               <a:ext uri="{FF2B5EF4-FFF2-40B4-BE49-F238E27FC236}">
-                <a16:creationId xmlns:a16="http://schemas.microsoft.com/office/drawing/2014/main" xmlns="" id="{97A1733E-05EA-4892-9222-96356ACBDF86}"/>
+                <a16:creationId xmlns="" xmlns:a16="http://schemas.microsoft.com/office/drawing/2014/main" id="{97A1733E-05EA-4892-9222-96356ACBDF86}"/>
               </a:ext>
             </a:extLst>
           </p:cNvPr>
@@ -3429,7 +3429,7 @@
           <p:cNvPr id="16" name="Picture 15">
             <a:extLst>
               <a:ext uri="{FF2B5EF4-FFF2-40B4-BE49-F238E27FC236}">
-                <a16:creationId xmlns:a16="http://schemas.microsoft.com/office/drawing/2014/main" xmlns="" id="{2FE050E4-DC54-4CF4-A8D3-DC8B8DA04ECB}"/>
+                <a16:creationId xmlns="" xmlns:a16="http://schemas.microsoft.com/office/drawing/2014/main" id="{2FE050E4-DC54-4CF4-A8D3-DC8B8DA04ECB}"/>
               </a:ext>
             </a:extLst>
           </p:cNvPr>
@@ -3465,7 +3465,7 @@
           <p:cNvPr id="18" name="Rectangle 17">
             <a:extLst>
               <a:ext uri="{FF2B5EF4-FFF2-40B4-BE49-F238E27FC236}">
-                <a16:creationId xmlns:a16="http://schemas.microsoft.com/office/drawing/2014/main" xmlns="" id="{B2B94D3F-5DC8-4398-914C-4833ABE4CC19}"/>
+                <a16:creationId xmlns="" xmlns:a16="http://schemas.microsoft.com/office/drawing/2014/main" id="{B2B94D3F-5DC8-4398-914C-4833ABE4CC19}"/>
               </a:ext>
             </a:extLst>
           </p:cNvPr>
@@ -3593,7 +3593,7 @@
           <p:cNvPr id="36" name="Picture 35">
             <a:extLst>
               <a:ext uri="{FF2B5EF4-FFF2-40B4-BE49-F238E27FC236}">
-                <a16:creationId xmlns:a16="http://schemas.microsoft.com/office/drawing/2014/main" xmlns="" id="{B21D9C95-5FF6-4F7E-AC00-ED6F3DD385F0}"/>
+                <a16:creationId xmlns="" xmlns:a16="http://schemas.microsoft.com/office/drawing/2014/main" id="{B21D9C95-5FF6-4F7E-AC00-ED6F3DD385F0}"/>
               </a:ext>
             </a:extLst>
           </p:cNvPr>
@@ -3622,7 +3622,7 @@
           <p:cNvPr id="56" name="Picture 55">
             <a:extLst>
               <a:ext uri="{FF2B5EF4-FFF2-40B4-BE49-F238E27FC236}">
-                <a16:creationId xmlns:a16="http://schemas.microsoft.com/office/drawing/2014/main" xmlns="" id="{DEAD13D1-8921-41EB-9EDF-DA3F5121F449}"/>
+                <a16:creationId xmlns="" xmlns:a16="http://schemas.microsoft.com/office/drawing/2014/main" id="{DEAD13D1-8921-41EB-9EDF-DA3F5121F449}"/>
               </a:ext>
             </a:extLst>
           </p:cNvPr>
@@ -3651,7 +3651,7 @@
           <p:cNvPr id="19" name="Rectangle 18">
             <a:extLst>
               <a:ext uri="{FF2B5EF4-FFF2-40B4-BE49-F238E27FC236}">
-                <a16:creationId xmlns:a16="http://schemas.microsoft.com/office/drawing/2014/main" xmlns="" id="{7CFDBB16-985C-4CC7-B6DB-B81B36037922}"/>
+                <a16:creationId xmlns="" xmlns:a16="http://schemas.microsoft.com/office/drawing/2014/main" id="{7CFDBB16-985C-4CC7-B6DB-B81B36037922}"/>
               </a:ext>
             </a:extLst>
           </p:cNvPr>
@@ -3750,7 +3750,7 @@
           <p:cNvPr id="26" name="Picture 25">
             <a:extLst>
               <a:ext uri="{FF2B5EF4-FFF2-40B4-BE49-F238E27FC236}">
-                <a16:creationId xmlns:a16="http://schemas.microsoft.com/office/drawing/2014/main" xmlns="" id="{247CFF3C-C4FA-493D-8505-DF469F4D36A4}"/>
+                <a16:creationId xmlns="" xmlns:a16="http://schemas.microsoft.com/office/drawing/2014/main" id="{247CFF3C-C4FA-493D-8505-DF469F4D36A4}"/>
               </a:ext>
             </a:extLst>
           </p:cNvPr>
@@ -3786,7 +3786,7 @@
           <p:cNvPr id="42" name="Picture 41">
             <a:extLst>
               <a:ext uri="{FF2B5EF4-FFF2-40B4-BE49-F238E27FC236}">
-                <a16:creationId xmlns:a16="http://schemas.microsoft.com/office/drawing/2014/main" xmlns="" id="{320846EB-6FC8-4F9D-97D0-A1A8E9CEE0DE}"/>
+                <a16:creationId xmlns="" xmlns:a16="http://schemas.microsoft.com/office/drawing/2014/main" id="{320846EB-6FC8-4F9D-97D0-A1A8E9CEE0DE}"/>
               </a:ext>
             </a:extLst>
           </p:cNvPr>
@@ -3822,7 +3822,7 @@
           <p:cNvPr id="2" name="Date Placeholder 1">
             <a:extLst>
               <a:ext uri="{FF2B5EF4-FFF2-40B4-BE49-F238E27FC236}">
-                <a16:creationId xmlns:a16="http://schemas.microsoft.com/office/drawing/2014/main" xmlns="" id="{839983C1-41F3-4B45-9E6B-F2615F743C0A}"/>
+                <a16:creationId xmlns="" xmlns:a16="http://schemas.microsoft.com/office/drawing/2014/main" id="{839983C1-41F3-4B45-9E6B-F2615F743C0A}"/>
               </a:ext>
             </a:extLst>
           </p:cNvPr>
@@ -3841,7 +3841,7 @@
             <a:fld id="{055373AC-9AA7-423B-BA00-BA1C74164DBD}" type="datetime1">
               <a:rPr lang="en-US" smtClean="0"/>
               <a:pPr/>
-              <a:t>9/18/2018</a:t>
+              <a:t>11/2/2018</a:t>
             </a:fld>
             <a:endParaRPr lang="en-US" dirty="0"/>
           </a:p>
@@ -3852,7 +3852,7 @@
           <p:cNvPr id="6" name="Footer Placeholder 5">
             <a:extLst>
               <a:ext uri="{FF2B5EF4-FFF2-40B4-BE49-F238E27FC236}">
-                <a16:creationId xmlns:a16="http://schemas.microsoft.com/office/drawing/2014/main" xmlns="" id="{A32622C9-3C7D-445D-83B2-28583716E287}"/>
+                <a16:creationId xmlns="" xmlns:a16="http://schemas.microsoft.com/office/drawing/2014/main" id="{A32622C9-3C7D-445D-83B2-28583716E287}"/>
               </a:ext>
             </a:extLst>
           </p:cNvPr>
@@ -3877,7 +3877,7 @@
           <p:cNvPr id="7" name="Slide Number Placeholder 6">
             <a:extLst>
               <a:ext uri="{FF2B5EF4-FFF2-40B4-BE49-F238E27FC236}">
-                <a16:creationId xmlns:a16="http://schemas.microsoft.com/office/drawing/2014/main" xmlns="" id="{2404DAB2-278F-4812-9F5E-FB63D8068383}"/>
+                <a16:creationId xmlns="" xmlns:a16="http://schemas.microsoft.com/office/drawing/2014/main" id="{2404DAB2-278F-4812-9F5E-FB63D8068383}"/>
               </a:ext>
             </a:extLst>
           </p:cNvPr>
@@ -3907,7 +3907,7 @@
           <p:cNvPr id="18" name="Picture 17">
             <a:extLst>
               <a:ext uri="{FF2B5EF4-FFF2-40B4-BE49-F238E27FC236}">
-                <a16:creationId xmlns:a16="http://schemas.microsoft.com/office/drawing/2014/main" xmlns="" id="{A0675455-B7FA-4569-A5FD-A3B0F20B2A26}"/>
+                <a16:creationId xmlns="" xmlns:a16="http://schemas.microsoft.com/office/drawing/2014/main" id="{A0675455-B7FA-4569-A5FD-A3B0F20B2A26}"/>
               </a:ext>
             </a:extLst>
           </p:cNvPr>
@@ -3943,7 +3943,7 @@
           <p:cNvPr id="20" name="Picture 19">
             <a:extLst>
               <a:ext uri="{FF2B5EF4-FFF2-40B4-BE49-F238E27FC236}">
-                <a16:creationId xmlns:a16="http://schemas.microsoft.com/office/drawing/2014/main" xmlns="" id="{827D15FD-4C66-4B85-98E6-7826AA8F61C6}"/>
+                <a16:creationId xmlns="" xmlns:a16="http://schemas.microsoft.com/office/drawing/2014/main" id="{827D15FD-4C66-4B85-98E6-7826AA8F61C6}"/>
               </a:ext>
             </a:extLst>
           </p:cNvPr>
@@ -3979,7 +3979,7 @@
           <p:cNvPr id="21" name="Picture 20">
             <a:extLst>
               <a:ext uri="{FF2B5EF4-FFF2-40B4-BE49-F238E27FC236}">
-                <a16:creationId xmlns:a16="http://schemas.microsoft.com/office/drawing/2014/main" xmlns="" id="{EA755AAE-BA08-481C-9224-0061170EE4B8}"/>
+                <a16:creationId xmlns="" xmlns:a16="http://schemas.microsoft.com/office/drawing/2014/main" id="{EA755AAE-BA08-481C-9224-0061170EE4B8}"/>
               </a:ext>
             </a:extLst>
           </p:cNvPr>
@@ -4015,7 +4015,7 @@
           <p:cNvPr id="22" name="Picture 21">
             <a:extLst>
               <a:ext uri="{FF2B5EF4-FFF2-40B4-BE49-F238E27FC236}">
-                <a16:creationId xmlns:a16="http://schemas.microsoft.com/office/drawing/2014/main" xmlns="" id="{0A83D66F-855B-463B-920B-BF239B01A206}"/>
+                <a16:creationId xmlns="" xmlns:a16="http://schemas.microsoft.com/office/drawing/2014/main" id="{0A83D66F-855B-463B-920B-BF239B01A206}"/>
               </a:ext>
             </a:extLst>
           </p:cNvPr>
@@ -4051,7 +4051,7 @@
           <p:cNvPr id="23" name="Picture 22">
             <a:extLst>
               <a:ext uri="{FF2B5EF4-FFF2-40B4-BE49-F238E27FC236}">
-                <a16:creationId xmlns:a16="http://schemas.microsoft.com/office/drawing/2014/main" xmlns="" id="{6643F71A-2013-433A-8322-FBAAED3162D8}"/>
+                <a16:creationId xmlns="" xmlns:a16="http://schemas.microsoft.com/office/drawing/2014/main" id="{6643F71A-2013-433A-8322-FBAAED3162D8}"/>
               </a:ext>
             </a:extLst>
           </p:cNvPr>
@@ -4087,7 +4087,7 @@
           <p:cNvPr id="24" name="Picture 23">
             <a:extLst>
               <a:ext uri="{FF2B5EF4-FFF2-40B4-BE49-F238E27FC236}">
-                <a16:creationId xmlns:a16="http://schemas.microsoft.com/office/drawing/2014/main" xmlns="" id="{B0812936-74B6-4265-8C08-AEDC8C798702}"/>
+                <a16:creationId xmlns="" xmlns:a16="http://schemas.microsoft.com/office/drawing/2014/main" id="{B0812936-74B6-4265-8C08-AEDC8C798702}"/>
               </a:ext>
             </a:extLst>
           </p:cNvPr>
@@ -4123,7 +4123,7 @@
           <p:cNvPr id="25" name="Picture 24">
             <a:extLst>
               <a:ext uri="{FF2B5EF4-FFF2-40B4-BE49-F238E27FC236}">
-                <a16:creationId xmlns:a16="http://schemas.microsoft.com/office/drawing/2014/main" xmlns="" id="{C74C190C-5856-41B9-8819-AE8DE0E10980}"/>
+                <a16:creationId xmlns="" xmlns:a16="http://schemas.microsoft.com/office/drawing/2014/main" id="{C74C190C-5856-41B9-8819-AE8DE0E10980}"/>
               </a:ext>
             </a:extLst>
           </p:cNvPr>
@@ -4159,7 +4159,7 @@
           <p:cNvPr id="27" name="Straight Connector 26">
             <a:extLst>
               <a:ext uri="{FF2B5EF4-FFF2-40B4-BE49-F238E27FC236}">
-                <a16:creationId xmlns:a16="http://schemas.microsoft.com/office/drawing/2014/main" xmlns="" id="{5F62FB7C-BD6E-4383-98C1-2CF30F34CAFD}"/>
+                <a16:creationId xmlns="" xmlns:a16="http://schemas.microsoft.com/office/drawing/2014/main" id="{5F62FB7C-BD6E-4383-98C1-2CF30F34CAFD}"/>
               </a:ext>
             </a:extLst>
           </p:cNvPr>
@@ -4198,7 +4198,7 @@
           <p:cNvPr id="28" name="Straight Connector 27">
             <a:extLst>
               <a:ext uri="{FF2B5EF4-FFF2-40B4-BE49-F238E27FC236}">
-                <a16:creationId xmlns:a16="http://schemas.microsoft.com/office/drawing/2014/main" xmlns="" id="{D4E5982E-3110-47E1-A5BB-91B7BECC3093}"/>
+                <a16:creationId xmlns="" xmlns:a16="http://schemas.microsoft.com/office/drawing/2014/main" id="{D4E5982E-3110-47E1-A5BB-91B7BECC3093}"/>
               </a:ext>
             </a:extLst>
           </p:cNvPr>
@@ -4235,7 +4235,7 @@
           <p:cNvPr id="29" name="Straight Connector 28">
             <a:extLst>
               <a:ext uri="{FF2B5EF4-FFF2-40B4-BE49-F238E27FC236}">
-                <a16:creationId xmlns:a16="http://schemas.microsoft.com/office/drawing/2014/main" xmlns="" id="{72BFE2F3-0845-4E5B-9375-E9D4027DD675}"/>
+                <a16:creationId xmlns="" xmlns:a16="http://schemas.microsoft.com/office/drawing/2014/main" id="{72BFE2F3-0845-4E5B-9375-E9D4027DD675}"/>
               </a:ext>
             </a:extLst>
           </p:cNvPr>
@@ -4272,7 +4272,7 @@
           <p:cNvPr id="30" name="Straight Connector 29">
             <a:extLst>
               <a:ext uri="{FF2B5EF4-FFF2-40B4-BE49-F238E27FC236}">
-                <a16:creationId xmlns:a16="http://schemas.microsoft.com/office/drawing/2014/main" xmlns="" id="{93DDBF37-0764-47AA-94E3-9A44F3ED8FB5}"/>
+                <a16:creationId xmlns="" xmlns:a16="http://schemas.microsoft.com/office/drawing/2014/main" id="{93DDBF37-0764-47AA-94E3-9A44F3ED8FB5}"/>
               </a:ext>
             </a:extLst>
           </p:cNvPr>
@@ -4309,7 +4309,7 @@
           <p:cNvPr id="31" name="Straight Connector 30">
             <a:extLst>
               <a:ext uri="{FF2B5EF4-FFF2-40B4-BE49-F238E27FC236}">
-                <a16:creationId xmlns:a16="http://schemas.microsoft.com/office/drawing/2014/main" xmlns="" id="{299ABE09-E33C-46B7-A80D-7BF4A6956211}"/>
+                <a16:creationId xmlns="" xmlns:a16="http://schemas.microsoft.com/office/drawing/2014/main" id="{299ABE09-E33C-46B7-A80D-7BF4A6956211}"/>
               </a:ext>
             </a:extLst>
           </p:cNvPr>
@@ -4346,7 +4346,7 @@
           <p:cNvPr id="32" name="Straight Connector 31">
             <a:extLst>
               <a:ext uri="{FF2B5EF4-FFF2-40B4-BE49-F238E27FC236}">
-                <a16:creationId xmlns:a16="http://schemas.microsoft.com/office/drawing/2014/main" xmlns="" id="{6E91D320-3732-40B8-864D-142D0A277ED1}"/>
+                <a16:creationId xmlns="" xmlns:a16="http://schemas.microsoft.com/office/drawing/2014/main" id="{6E91D320-3732-40B8-864D-142D0A277ED1}"/>
               </a:ext>
             </a:extLst>
           </p:cNvPr>
@@ -4385,7 +4385,7 @@
           <p:cNvPr id="33" name="Straight Connector 32">
             <a:extLst>
               <a:ext uri="{FF2B5EF4-FFF2-40B4-BE49-F238E27FC236}">
-                <a16:creationId xmlns:a16="http://schemas.microsoft.com/office/drawing/2014/main" xmlns="" id="{5C63D1E8-4A92-4691-8A24-A2FC7E8008E5}"/>
+                <a16:creationId xmlns="" xmlns:a16="http://schemas.microsoft.com/office/drawing/2014/main" id="{5C63D1E8-4A92-4691-8A24-A2FC7E8008E5}"/>
               </a:ext>
             </a:extLst>
           </p:cNvPr>
@@ -4424,7 +4424,7 @@
           <p:cNvPr id="34" name="Straight Connector 33">
             <a:extLst>
               <a:ext uri="{FF2B5EF4-FFF2-40B4-BE49-F238E27FC236}">
-                <a16:creationId xmlns:a16="http://schemas.microsoft.com/office/drawing/2014/main" xmlns="" id="{C84A0FE1-723D-4682-8682-77BAD950EE15}"/>
+                <a16:creationId xmlns="" xmlns:a16="http://schemas.microsoft.com/office/drawing/2014/main" id="{C84A0FE1-723D-4682-8682-77BAD950EE15}"/>
               </a:ext>
             </a:extLst>
           </p:cNvPr>
@@ -4461,7 +4461,7 @@
           <p:cNvPr id="35" name="Rectangle 34">
             <a:extLst>
               <a:ext uri="{FF2B5EF4-FFF2-40B4-BE49-F238E27FC236}">
-                <a16:creationId xmlns:a16="http://schemas.microsoft.com/office/drawing/2014/main" xmlns="" id="{550A59F9-9A9D-4956-95B4-F78CC0DB1D59}"/>
+                <a16:creationId xmlns="" xmlns:a16="http://schemas.microsoft.com/office/drawing/2014/main" id="{550A59F9-9A9D-4956-95B4-F78CC0DB1D59}"/>
               </a:ext>
             </a:extLst>
           </p:cNvPr>
@@ -4542,7 +4542,7 @@
           <p:cNvPr id="37" name="Picture 36">
             <a:extLst>
               <a:ext uri="{FF2B5EF4-FFF2-40B4-BE49-F238E27FC236}">
-                <a16:creationId xmlns:a16="http://schemas.microsoft.com/office/drawing/2014/main" xmlns="" id="{8AF69835-F228-45D6-B39E-583EEBF1FE2D}"/>
+                <a16:creationId xmlns="" xmlns:a16="http://schemas.microsoft.com/office/drawing/2014/main" id="{8AF69835-F228-45D6-B39E-583EEBF1FE2D}"/>
               </a:ext>
             </a:extLst>
           </p:cNvPr>
@@ -4578,7 +4578,7 @@
           <p:cNvPr id="38" name="Picture 37">
             <a:extLst>
               <a:ext uri="{FF2B5EF4-FFF2-40B4-BE49-F238E27FC236}">
-                <a16:creationId xmlns:a16="http://schemas.microsoft.com/office/drawing/2014/main" xmlns="" id="{0577C4C0-8539-4520-A497-BBFB45821D24}"/>
+                <a16:creationId xmlns="" xmlns:a16="http://schemas.microsoft.com/office/drawing/2014/main" id="{0577C4C0-8539-4520-A497-BBFB45821D24}"/>
               </a:ext>
             </a:extLst>
           </p:cNvPr>
@@ -4614,7 +4614,7 @@
           <p:cNvPr id="39" name="Picture 38">
             <a:extLst>
               <a:ext uri="{FF2B5EF4-FFF2-40B4-BE49-F238E27FC236}">
-                <a16:creationId xmlns:a16="http://schemas.microsoft.com/office/drawing/2014/main" xmlns="" id="{16073A22-1B90-4D35-943B-5D9816FEB8FE}"/>
+                <a16:creationId xmlns="" xmlns:a16="http://schemas.microsoft.com/office/drawing/2014/main" id="{16073A22-1B90-4D35-943B-5D9816FEB8FE}"/>
               </a:ext>
             </a:extLst>
           </p:cNvPr>
@@ -4650,7 +4650,7 @@
           <p:cNvPr id="40" name="Picture 39">
             <a:extLst>
               <a:ext uri="{FF2B5EF4-FFF2-40B4-BE49-F238E27FC236}">
-                <a16:creationId xmlns:a16="http://schemas.microsoft.com/office/drawing/2014/main" xmlns="" id="{F7C8CFEA-27DA-4058-A611-3AE53851908C}"/>
+                <a16:creationId xmlns="" xmlns:a16="http://schemas.microsoft.com/office/drawing/2014/main" id="{F7C8CFEA-27DA-4058-A611-3AE53851908C}"/>
               </a:ext>
             </a:extLst>
           </p:cNvPr>
@@ -4686,7 +4686,7 @@
           <p:cNvPr id="41" name="Picture 40">
             <a:extLst>
               <a:ext uri="{FF2B5EF4-FFF2-40B4-BE49-F238E27FC236}">
-                <a16:creationId xmlns:a16="http://schemas.microsoft.com/office/drawing/2014/main" xmlns="" id="{CE9346DD-5152-48D0-8B06-7F8CE9803DAB}"/>
+                <a16:creationId xmlns="" xmlns:a16="http://schemas.microsoft.com/office/drawing/2014/main" id="{CE9346DD-5152-48D0-8B06-7F8CE9803DAB}"/>
               </a:ext>
             </a:extLst>
           </p:cNvPr>
@@ -4722,7 +4722,7 @@
           <p:cNvPr id="43" name="Picture 42">
             <a:extLst>
               <a:ext uri="{FF2B5EF4-FFF2-40B4-BE49-F238E27FC236}">
-                <a16:creationId xmlns:a16="http://schemas.microsoft.com/office/drawing/2014/main" xmlns="" id="{F6B4B602-D2C7-47C8-9470-2C5795ED8C22}"/>
+                <a16:creationId xmlns="" xmlns:a16="http://schemas.microsoft.com/office/drawing/2014/main" id="{F6B4B602-D2C7-47C8-9470-2C5795ED8C22}"/>
               </a:ext>
             </a:extLst>
           </p:cNvPr>
@@ -4758,7 +4758,7 @@
           <p:cNvPr id="44" name="Picture 43">
             <a:extLst>
               <a:ext uri="{FF2B5EF4-FFF2-40B4-BE49-F238E27FC236}">
-                <a16:creationId xmlns:a16="http://schemas.microsoft.com/office/drawing/2014/main" xmlns="" id="{103B7E6D-AFDD-45E1-8121-F42E465AB0E8}"/>
+                <a16:creationId xmlns="" xmlns:a16="http://schemas.microsoft.com/office/drawing/2014/main" id="{103B7E6D-AFDD-45E1-8121-F42E465AB0E8}"/>
               </a:ext>
             </a:extLst>
           </p:cNvPr>
@@ -4794,7 +4794,7 @@
           <p:cNvPr id="45" name="Straight Connector 44">
             <a:extLst>
               <a:ext uri="{FF2B5EF4-FFF2-40B4-BE49-F238E27FC236}">
-                <a16:creationId xmlns:a16="http://schemas.microsoft.com/office/drawing/2014/main" xmlns="" id="{5FA3191E-14EF-4DC3-AD93-CA289B12B4C9}"/>
+                <a16:creationId xmlns="" xmlns:a16="http://schemas.microsoft.com/office/drawing/2014/main" id="{5FA3191E-14EF-4DC3-AD93-CA289B12B4C9}"/>
               </a:ext>
             </a:extLst>
           </p:cNvPr>
@@ -4833,7 +4833,7 @@
           <p:cNvPr id="46" name="Straight Connector 45">
             <a:extLst>
               <a:ext uri="{FF2B5EF4-FFF2-40B4-BE49-F238E27FC236}">
-                <a16:creationId xmlns:a16="http://schemas.microsoft.com/office/drawing/2014/main" xmlns="" id="{AB530A8A-ABDE-4B7F-B28B-A9B499B32225}"/>
+                <a16:creationId xmlns="" xmlns:a16="http://schemas.microsoft.com/office/drawing/2014/main" id="{AB530A8A-ABDE-4B7F-B28B-A9B499B32225}"/>
               </a:ext>
             </a:extLst>
           </p:cNvPr>
@@ -4870,7 +4870,7 @@
           <p:cNvPr id="47" name="Straight Connector 46">
             <a:extLst>
               <a:ext uri="{FF2B5EF4-FFF2-40B4-BE49-F238E27FC236}">
-                <a16:creationId xmlns:a16="http://schemas.microsoft.com/office/drawing/2014/main" xmlns="" id="{E5ADF575-91AD-4F69-BA66-356B62AEB683}"/>
+                <a16:creationId xmlns="" xmlns:a16="http://schemas.microsoft.com/office/drawing/2014/main" id="{E5ADF575-91AD-4F69-BA66-356B62AEB683}"/>
               </a:ext>
             </a:extLst>
           </p:cNvPr>
@@ -4907,7 +4907,7 @@
           <p:cNvPr id="48" name="Straight Connector 47">
             <a:extLst>
               <a:ext uri="{FF2B5EF4-FFF2-40B4-BE49-F238E27FC236}">
-                <a16:creationId xmlns:a16="http://schemas.microsoft.com/office/drawing/2014/main" xmlns="" id="{D60C0104-2410-4352-A800-FD0292CC11A7}"/>
+                <a16:creationId xmlns="" xmlns:a16="http://schemas.microsoft.com/office/drawing/2014/main" id="{D60C0104-2410-4352-A800-FD0292CC11A7}"/>
               </a:ext>
             </a:extLst>
           </p:cNvPr>
@@ -4944,7 +4944,7 @@
           <p:cNvPr id="49" name="Straight Connector 48">
             <a:extLst>
               <a:ext uri="{FF2B5EF4-FFF2-40B4-BE49-F238E27FC236}">
-                <a16:creationId xmlns:a16="http://schemas.microsoft.com/office/drawing/2014/main" xmlns="" id="{10FB7F08-6662-4D0C-AFAB-CFFDE9B1CA0A}"/>
+                <a16:creationId xmlns="" xmlns:a16="http://schemas.microsoft.com/office/drawing/2014/main" id="{10FB7F08-6662-4D0C-AFAB-CFFDE9B1CA0A}"/>
               </a:ext>
             </a:extLst>
           </p:cNvPr>
@@ -4981,7 +4981,7 @@
           <p:cNvPr id="50" name="Straight Connector 49">
             <a:extLst>
               <a:ext uri="{FF2B5EF4-FFF2-40B4-BE49-F238E27FC236}">
-                <a16:creationId xmlns:a16="http://schemas.microsoft.com/office/drawing/2014/main" xmlns="" id="{379635D4-E3FF-4174-A648-032E9615851B}"/>
+                <a16:creationId xmlns="" xmlns:a16="http://schemas.microsoft.com/office/drawing/2014/main" id="{379635D4-E3FF-4174-A648-032E9615851B}"/>
               </a:ext>
             </a:extLst>
           </p:cNvPr>
@@ -5020,7 +5020,7 @@
           <p:cNvPr id="51" name="Straight Connector 50">
             <a:extLst>
               <a:ext uri="{FF2B5EF4-FFF2-40B4-BE49-F238E27FC236}">
-                <a16:creationId xmlns:a16="http://schemas.microsoft.com/office/drawing/2014/main" xmlns="" id="{0601A2EF-9181-444B-8898-83A36D09B869}"/>
+                <a16:creationId xmlns="" xmlns:a16="http://schemas.microsoft.com/office/drawing/2014/main" id="{0601A2EF-9181-444B-8898-83A36D09B869}"/>
               </a:ext>
             </a:extLst>
           </p:cNvPr>
@@ -5059,7 +5059,7 @@
           <p:cNvPr id="52" name="Straight Connector 51">
             <a:extLst>
               <a:ext uri="{FF2B5EF4-FFF2-40B4-BE49-F238E27FC236}">
-                <a16:creationId xmlns:a16="http://schemas.microsoft.com/office/drawing/2014/main" xmlns="" id="{307F38C1-A87B-4D59-BE69-6A23413F5870}"/>
+                <a16:creationId xmlns="" xmlns:a16="http://schemas.microsoft.com/office/drawing/2014/main" id="{307F38C1-A87B-4D59-BE69-6A23413F5870}"/>
               </a:ext>
             </a:extLst>
           </p:cNvPr>
@@ -5112,7 +5112,7 @@
   <p:hf hdr="0" ftr="0" dt="0"/>
   <p:extLst mod="1">
     <p:ext uri="{DCECCB84-F9BA-43D5-87BE-67443E8EF086}">
-      <p15:sldGuideLst xmlns:p15="http://schemas.microsoft.com/office/powerpoint/2012/main" xmlns="">
+      <p15:sldGuideLst xmlns="" xmlns:p15="http://schemas.microsoft.com/office/powerpoint/2012/main">
         <p15:guide id="1" orient="horz" pos="2160">
           <p15:clr>
             <a:srgbClr val="FBAE40"/>
@@ -5151,7 +5151,7 @@
           <p:cNvPr id="13" name="Picture 12">
             <a:extLst>
               <a:ext uri="{FF2B5EF4-FFF2-40B4-BE49-F238E27FC236}">
-                <a16:creationId xmlns:a16="http://schemas.microsoft.com/office/drawing/2014/main" xmlns="" id="{C00C2D88-4D3E-4C4B-AFD7-B7EA2768B8F5}"/>
+                <a16:creationId xmlns="" xmlns:a16="http://schemas.microsoft.com/office/drawing/2014/main" id="{C00C2D88-4D3E-4C4B-AFD7-B7EA2768B8F5}"/>
               </a:ext>
             </a:extLst>
           </p:cNvPr>
@@ -5180,7 +5180,7 @@
           <p:cNvPr id="3" name="Date Placeholder 2">
             <a:extLst>
               <a:ext uri="{FF2B5EF4-FFF2-40B4-BE49-F238E27FC236}">
-                <a16:creationId xmlns:a16="http://schemas.microsoft.com/office/drawing/2014/main" xmlns="" id="{FAA51FC5-6AB6-4A04-9304-C6C88E9B29FA}"/>
+                <a16:creationId xmlns="" xmlns:a16="http://schemas.microsoft.com/office/drawing/2014/main" id="{FAA51FC5-6AB6-4A04-9304-C6C88E9B29FA}"/>
               </a:ext>
             </a:extLst>
           </p:cNvPr>
@@ -5199,7 +5199,7 @@
             <a:fld id="{055373AC-9AA7-423B-BA00-BA1C74164DBD}" type="datetime1">
               <a:rPr lang="en-US" smtClean="0"/>
               <a:pPr/>
-              <a:t>9/18/2018</a:t>
+              <a:t>11/2/2018</a:t>
             </a:fld>
             <a:endParaRPr lang="en-US" dirty="0"/>
           </a:p>
@@ -5210,7 +5210,7 @@
           <p:cNvPr id="4" name="Footer Placeholder 3">
             <a:extLst>
               <a:ext uri="{FF2B5EF4-FFF2-40B4-BE49-F238E27FC236}">
-                <a16:creationId xmlns:a16="http://schemas.microsoft.com/office/drawing/2014/main" xmlns="" id="{75D83D18-FDC7-4C48-A949-71D2969C594A}"/>
+                <a16:creationId xmlns="" xmlns:a16="http://schemas.microsoft.com/office/drawing/2014/main" id="{75D83D18-FDC7-4C48-A949-71D2969C594A}"/>
               </a:ext>
             </a:extLst>
           </p:cNvPr>
@@ -5235,7 +5235,7 @@
           <p:cNvPr id="5" name="Slide Number Placeholder 4">
             <a:extLst>
               <a:ext uri="{FF2B5EF4-FFF2-40B4-BE49-F238E27FC236}">
-                <a16:creationId xmlns:a16="http://schemas.microsoft.com/office/drawing/2014/main" xmlns="" id="{6AFAD92E-A653-4789-B55D-8A2181002B59}"/>
+                <a16:creationId xmlns="" xmlns:a16="http://schemas.microsoft.com/office/drawing/2014/main" id="{6AFAD92E-A653-4789-B55D-8A2181002B59}"/>
               </a:ext>
             </a:extLst>
           </p:cNvPr>
@@ -5266,7 +5266,7 @@
             <a:hlinkClick r:id="rId3"/>
             <a:extLst>
               <a:ext uri="{FF2B5EF4-FFF2-40B4-BE49-F238E27FC236}">
-                <a16:creationId xmlns:a16="http://schemas.microsoft.com/office/drawing/2014/main" xmlns="" id="{7C54483B-C622-499B-BAE8-467BFD3E1080}"/>
+                <a16:creationId xmlns="" xmlns:a16="http://schemas.microsoft.com/office/drawing/2014/main" id="{7C54483B-C622-499B-BAE8-467BFD3E1080}"/>
               </a:ext>
             </a:extLst>
           </p:cNvPr>
@@ -5305,7 +5305,7 @@
             <a:hlinkClick r:id="rId5"/>
             <a:extLst>
               <a:ext uri="{FF2B5EF4-FFF2-40B4-BE49-F238E27FC236}">
-                <a16:creationId xmlns:a16="http://schemas.microsoft.com/office/drawing/2014/main" xmlns="" id="{7AF9BEA8-CB87-4D39-873A-4E7E04D46685}"/>
+                <a16:creationId xmlns="" xmlns:a16="http://schemas.microsoft.com/office/drawing/2014/main" id="{7AF9BEA8-CB87-4D39-873A-4E7E04D46685}"/>
               </a:ext>
             </a:extLst>
           </p:cNvPr>
@@ -5344,7 +5344,7 @@
             <a:hlinkClick r:id="rId7"/>
             <a:extLst>
               <a:ext uri="{FF2B5EF4-FFF2-40B4-BE49-F238E27FC236}">
-                <a16:creationId xmlns:a16="http://schemas.microsoft.com/office/drawing/2014/main" xmlns="" id="{7DFD3364-5D9B-4B91-B09C-8540E820560A}"/>
+                <a16:creationId xmlns="" xmlns:a16="http://schemas.microsoft.com/office/drawing/2014/main" id="{7DFD3364-5D9B-4B91-B09C-8540E820560A}"/>
               </a:ext>
             </a:extLst>
           </p:cNvPr>
@@ -5383,7 +5383,7 @@
             <a:hlinkClick r:id="rId9"/>
             <a:extLst>
               <a:ext uri="{FF2B5EF4-FFF2-40B4-BE49-F238E27FC236}">
-                <a16:creationId xmlns:a16="http://schemas.microsoft.com/office/drawing/2014/main" xmlns="" id="{F0386401-29A7-4448-AB68-1289BA211F55}"/>
+                <a16:creationId xmlns="" xmlns:a16="http://schemas.microsoft.com/office/drawing/2014/main" id="{F0386401-29A7-4448-AB68-1289BA211F55}"/>
               </a:ext>
             </a:extLst>
           </p:cNvPr>
@@ -5421,7 +5421,7 @@
             <a:hlinkClick r:id="rId11"/>
             <a:extLst>
               <a:ext uri="{FF2B5EF4-FFF2-40B4-BE49-F238E27FC236}">
-                <a16:creationId xmlns:a16="http://schemas.microsoft.com/office/drawing/2014/main" xmlns="" id="{CDC9F208-E4B0-4626-BBAD-F54DFF0CF9B5}"/>
+                <a16:creationId xmlns="" xmlns:a16="http://schemas.microsoft.com/office/drawing/2014/main" id="{CDC9F208-E4B0-4626-BBAD-F54DFF0CF9B5}"/>
               </a:ext>
             </a:extLst>
           </p:cNvPr>
@@ -5460,7 +5460,7 @@
             <a:hlinkClick r:id="rId13"/>
             <a:extLst>
               <a:ext uri="{FF2B5EF4-FFF2-40B4-BE49-F238E27FC236}">
-                <a16:creationId xmlns:a16="http://schemas.microsoft.com/office/drawing/2014/main" xmlns="" id="{1DE8CA65-1470-4A40-9B49-AFF7E19C21A0}"/>
+                <a16:creationId xmlns="" xmlns:a16="http://schemas.microsoft.com/office/drawing/2014/main" id="{1DE8CA65-1470-4A40-9B49-AFF7E19C21A0}"/>
               </a:ext>
             </a:extLst>
           </p:cNvPr>
@@ -5498,7 +5498,7 @@
           <p:cNvPr id="14" name="Rectangle 13">
             <a:extLst>
               <a:ext uri="{FF2B5EF4-FFF2-40B4-BE49-F238E27FC236}">
-                <a16:creationId xmlns:a16="http://schemas.microsoft.com/office/drawing/2014/main" xmlns="" id="{26991FD8-5C91-4C3D-9F00-7203C811B463}"/>
+                <a16:creationId xmlns="" xmlns:a16="http://schemas.microsoft.com/office/drawing/2014/main" id="{26991FD8-5C91-4C3D-9F00-7203C811B463}"/>
               </a:ext>
             </a:extLst>
           </p:cNvPr>
@@ -5579,7 +5579,7 @@
           <p:cNvPr id="2" name="Title 1">
             <a:extLst>
               <a:ext uri="{FF2B5EF4-FFF2-40B4-BE49-F238E27FC236}">
-                <a16:creationId xmlns:a16="http://schemas.microsoft.com/office/drawing/2014/main" xmlns="" id="{239E3AAC-161E-41EF-A701-E46A497FCC37}"/>
+                <a16:creationId xmlns="" xmlns:a16="http://schemas.microsoft.com/office/drawing/2014/main" id="{239E3AAC-161E-41EF-A701-E46A497FCC37}"/>
               </a:ext>
             </a:extLst>
           </p:cNvPr>
@@ -5625,7 +5625,7 @@
           <p:cNvPr id="15" name="Picture 14">
             <a:extLst>
               <a:ext uri="{FF2B5EF4-FFF2-40B4-BE49-F238E27FC236}">
-                <a16:creationId xmlns:a16="http://schemas.microsoft.com/office/drawing/2014/main" xmlns="" id="{3F691F48-DCAC-4489-AA09-7346B7E67855}"/>
+                <a16:creationId xmlns="" xmlns:a16="http://schemas.microsoft.com/office/drawing/2014/main" id="{3F691F48-DCAC-4489-AA09-7346B7E67855}"/>
               </a:ext>
             </a:extLst>
           </p:cNvPr>
@@ -5699,7 +5699,7 @@
           <p:cNvPr id="13" name="Picture 12">
             <a:extLst>
               <a:ext uri="{FF2B5EF4-FFF2-40B4-BE49-F238E27FC236}">
-                <a16:creationId xmlns:a16="http://schemas.microsoft.com/office/drawing/2014/main" xmlns="" id="{C00C2D88-4D3E-4C4B-AFD7-B7EA2768B8F5}"/>
+                <a16:creationId xmlns="" xmlns:a16="http://schemas.microsoft.com/office/drawing/2014/main" id="{C00C2D88-4D3E-4C4B-AFD7-B7EA2768B8F5}"/>
               </a:ext>
             </a:extLst>
           </p:cNvPr>
@@ -5728,7 +5728,7 @@
           <p:cNvPr id="14" name="Rectangle 13">
             <a:extLst>
               <a:ext uri="{FF2B5EF4-FFF2-40B4-BE49-F238E27FC236}">
-                <a16:creationId xmlns:a16="http://schemas.microsoft.com/office/drawing/2014/main" xmlns="" id="{26991FD8-5C91-4C3D-9F00-7203C811B463}"/>
+                <a16:creationId xmlns="" xmlns:a16="http://schemas.microsoft.com/office/drawing/2014/main" id="{26991FD8-5C91-4C3D-9F00-7203C811B463}"/>
               </a:ext>
             </a:extLst>
           </p:cNvPr>
@@ -5809,7 +5809,7 @@
           <p:cNvPr id="2" name="Title 1">
             <a:extLst>
               <a:ext uri="{FF2B5EF4-FFF2-40B4-BE49-F238E27FC236}">
-                <a16:creationId xmlns:a16="http://schemas.microsoft.com/office/drawing/2014/main" xmlns="" id="{239E3AAC-161E-41EF-A701-E46A497FCC37}"/>
+                <a16:creationId xmlns="" xmlns:a16="http://schemas.microsoft.com/office/drawing/2014/main" id="{239E3AAC-161E-41EF-A701-E46A497FCC37}"/>
               </a:ext>
             </a:extLst>
           </p:cNvPr>
@@ -5856,7 +5856,7 @@
             <a:hlinkClick r:id="rId3"/>
             <a:extLst>
               <a:ext uri="{FF2B5EF4-FFF2-40B4-BE49-F238E27FC236}">
-                <a16:creationId xmlns:a16="http://schemas.microsoft.com/office/drawing/2014/main" xmlns="" id="{61839306-7842-46B9-A463-C24420A37C0A}"/>
+                <a16:creationId xmlns="" xmlns:a16="http://schemas.microsoft.com/office/drawing/2014/main" id="{61839306-7842-46B9-A463-C24420A37C0A}"/>
               </a:ext>
             </a:extLst>
           </p:cNvPr>
@@ -5900,7 +5900,7 @@
             <a:hlinkClick r:id="rId5"/>
             <a:extLst>
               <a:ext uri="{FF2B5EF4-FFF2-40B4-BE49-F238E27FC236}">
-                <a16:creationId xmlns:a16="http://schemas.microsoft.com/office/drawing/2014/main" xmlns="" id="{F5EB795D-0B62-4CCB-983D-13BD9B3CD0A5}"/>
+                <a16:creationId xmlns="" xmlns:a16="http://schemas.microsoft.com/office/drawing/2014/main" id="{F5EB795D-0B62-4CCB-983D-13BD9B3CD0A5}"/>
               </a:ext>
             </a:extLst>
           </p:cNvPr>
@@ -5948,7 +5948,7 @@
             <a:hlinkClick r:id="rId7"/>
             <a:extLst>
               <a:ext uri="{FF2B5EF4-FFF2-40B4-BE49-F238E27FC236}">
-                <a16:creationId xmlns:a16="http://schemas.microsoft.com/office/drawing/2014/main" xmlns="" id="{91C19F79-E05B-4929-A929-287F44EB3C94}"/>
+                <a16:creationId xmlns="" xmlns:a16="http://schemas.microsoft.com/office/drawing/2014/main" id="{91C19F79-E05B-4929-A929-287F44EB3C94}"/>
               </a:ext>
             </a:extLst>
           </p:cNvPr>
@@ -5996,7 +5996,7 @@
             <a:hlinkClick r:id="rId9"/>
             <a:extLst>
               <a:ext uri="{FF2B5EF4-FFF2-40B4-BE49-F238E27FC236}">
-                <a16:creationId xmlns:a16="http://schemas.microsoft.com/office/drawing/2014/main" xmlns="" id="{B38FBC35-D604-40D3-8560-90C506EBA728}"/>
+                <a16:creationId xmlns="" xmlns:a16="http://schemas.microsoft.com/office/drawing/2014/main" id="{B38FBC35-D604-40D3-8560-90C506EBA728}"/>
               </a:ext>
             </a:extLst>
           </p:cNvPr>
@@ -6042,7 +6042,7 @@
             <a:hlinkClick r:id="rId11"/>
             <a:extLst>
               <a:ext uri="{FF2B5EF4-FFF2-40B4-BE49-F238E27FC236}">
-                <a16:creationId xmlns:a16="http://schemas.microsoft.com/office/drawing/2014/main" xmlns="" id="{71103A5B-EAFD-46BF-93EB-10FFF58B7532}"/>
+                <a16:creationId xmlns="" xmlns:a16="http://schemas.microsoft.com/office/drawing/2014/main" id="{71103A5B-EAFD-46BF-93EB-10FFF58B7532}"/>
               </a:ext>
             </a:extLst>
           </p:cNvPr>
@@ -6090,7 +6090,7 @@
             <a:hlinkClick r:id="rId13"/>
             <a:extLst>
               <a:ext uri="{FF2B5EF4-FFF2-40B4-BE49-F238E27FC236}">
-                <a16:creationId xmlns:a16="http://schemas.microsoft.com/office/drawing/2014/main" xmlns="" id="{EDA50EFF-7A2E-4BB9-A7A8-5BBF9EE3DB69}"/>
+                <a16:creationId xmlns="" xmlns:a16="http://schemas.microsoft.com/office/drawing/2014/main" id="{EDA50EFF-7A2E-4BB9-A7A8-5BBF9EE3DB69}"/>
               </a:ext>
             </a:extLst>
           </p:cNvPr>
@@ -6137,7 +6137,7 @@
           <p:cNvPr id="21" name="Picture 20">
             <a:extLst>
               <a:ext uri="{FF2B5EF4-FFF2-40B4-BE49-F238E27FC236}">
-                <a16:creationId xmlns:a16="http://schemas.microsoft.com/office/drawing/2014/main" xmlns="" id="{31C8BF23-28B4-4942-902F-58C0B92A760B}"/>
+                <a16:creationId xmlns="" xmlns:a16="http://schemas.microsoft.com/office/drawing/2014/main" id="{31C8BF23-28B4-4942-902F-58C0B92A760B}"/>
               </a:ext>
             </a:extLst>
           </p:cNvPr>
@@ -6211,7 +6211,7 @@
           <p:cNvPr id="8" name="Picture 7">
             <a:extLst>
               <a:ext uri="{FF2B5EF4-FFF2-40B4-BE49-F238E27FC236}">
-                <a16:creationId xmlns:a16="http://schemas.microsoft.com/office/drawing/2014/main" xmlns="" id="{21DA41A3-0295-46DF-A320-41070D15EA50}"/>
+                <a16:creationId xmlns="" xmlns:a16="http://schemas.microsoft.com/office/drawing/2014/main" id="{21DA41A3-0295-46DF-A320-41070D15EA50}"/>
               </a:ext>
             </a:extLst>
           </p:cNvPr>
@@ -6240,7 +6240,7 @@
           <p:cNvPr id="12" name="Content Placeholder 3">
             <a:extLst>
               <a:ext uri="{FF2B5EF4-FFF2-40B4-BE49-F238E27FC236}">
-                <a16:creationId xmlns:a16="http://schemas.microsoft.com/office/drawing/2014/main" xmlns="" id="{0C1F9416-8B6E-46DE-973C-777785E27A26}"/>
+                <a16:creationId xmlns="" xmlns:a16="http://schemas.microsoft.com/office/drawing/2014/main" id="{0C1F9416-8B6E-46DE-973C-777785E27A26}"/>
               </a:ext>
             </a:extLst>
           </p:cNvPr>
@@ -6466,7 +6466,7 @@
             <a:hlinkClick r:id="rId7" tooltip="Software University @ Facebook"/>
             <a:extLst>
               <a:ext uri="{FF2B5EF4-FFF2-40B4-BE49-F238E27FC236}">
-                <a16:creationId xmlns:a16="http://schemas.microsoft.com/office/drawing/2014/main" xmlns="" id="{0101C673-F197-4525-ADDC-FFD181E4E167}"/>
+                <a16:creationId xmlns="" xmlns:a16="http://schemas.microsoft.com/office/drawing/2014/main" id="{0101C673-F197-4525-ADDC-FFD181E4E167}"/>
               </a:ext>
             </a:extLst>
           </p:cNvPr>
@@ -6513,7 +6513,7 @@
             <a:hlinkClick r:id="rId6" tooltip="Software University Discussion Forum"/>
             <a:extLst>
               <a:ext uri="{FF2B5EF4-FFF2-40B4-BE49-F238E27FC236}">
-                <a16:creationId xmlns:a16="http://schemas.microsoft.com/office/drawing/2014/main" xmlns="" id="{A584039C-C3B0-4714-A6D0-181CA3D2DD26}"/>
+                <a16:creationId xmlns="" xmlns:a16="http://schemas.microsoft.com/office/drawing/2014/main" id="{A584039C-C3B0-4714-A6D0-181CA3D2DD26}"/>
               </a:ext>
             </a:extLst>
           </p:cNvPr>
@@ -6550,7 +6550,7 @@
             <a:hlinkClick r:id="rId3"/>
             <a:extLst>
               <a:ext uri="{FF2B5EF4-FFF2-40B4-BE49-F238E27FC236}">
-                <a16:creationId xmlns:a16="http://schemas.microsoft.com/office/drawing/2014/main" xmlns="" id="{07C965FA-A87E-4824-AFA8-C67AF548A76A}"/>
+                <a16:creationId xmlns="" xmlns:a16="http://schemas.microsoft.com/office/drawing/2014/main" id="{07C965FA-A87E-4824-AFA8-C67AF548A76A}"/>
               </a:ext>
             </a:extLst>
           </p:cNvPr>
@@ -6586,7 +6586,7 @@
           <p:cNvPr id="3" name="Picture 2">
             <a:extLst>
               <a:ext uri="{FF2B5EF4-FFF2-40B4-BE49-F238E27FC236}">
-                <a16:creationId xmlns:a16="http://schemas.microsoft.com/office/drawing/2014/main" xmlns="" id="{7DC5D9AB-27D1-4866-B85E-1728987FAEF5}"/>
+                <a16:creationId xmlns="" xmlns:a16="http://schemas.microsoft.com/office/drawing/2014/main" id="{7DC5D9AB-27D1-4866-B85E-1728987FAEF5}"/>
               </a:ext>
             </a:extLst>
           </p:cNvPr>
@@ -6622,7 +6622,7 @@
           <p:cNvPr id="10" name="Rectangle 9">
             <a:extLst>
               <a:ext uri="{FF2B5EF4-FFF2-40B4-BE49-F238E27FC236}">
-                <a16:creationId xmlns:a16="http://schemas.microsoft.com/office/drawing/2014/main" xmlns="" id="{86646B95-5E3B-4DE8-9118-031C2C296D8C}"/>
+                <a16:creationId xmlns="" xmlns:a16="http://schemas.microsoft.com/office/drawing/2014/main" id="{86646B95-5E3B-4DE8-9118-031C2C296D8C}"/>
               </a:ext>
             </a:extLst>
           </p:cNvPr>
@@ -6703,7 +6703,7 @@
           <p:cNvPr id="18" name="Title 17">
             <a:extLst>
               <a:ext uri="{FF2B5EF4-FFF2-40B4-BE49-F238E27FC236}">
-                <a16:creationId xmlns:a16="http://schemas.microsoft.com/office/drawing/2014/main" xmlns="" id="{AE87ED9C-76E1-4D85-9B06-3AF44AABB668}"/>
+                <a16:creationId xmlns="" xmlns:a16="http://schemas.microsoft.com/office/drawing/2014/main" id="{AE87ED9C-76E1-4D85-9B06-3AF44AABB668}"/>
               </a:ext>
             </a:extLst>
           </p:cNvPr>
@@ -6791,7 +6791,7 @@
           <p:cNvPr id="10" name="Picture 9">
             <a:extLst>
               <a:ext uri="{FF2B5EF4-FFF2-40B4-BE49-F238E27FC236}">
-                <a16:creationId xmlns:a16="http://schemas.microsoft.com/office/drawing/2014/main" xmlns="" id="{89AD94B5-9922-4E42-89CE-3C445EFB152E}"/>
+                <a16:creationId xmlns="" xmlns:a16="http://schemas.microsoft.com/office/drawing/2014/main" id="{89AD94B5-9922-4E42-89CE-3C445EFB152E}"/>
               </a:ext>
             </a:extLst>
           </p:cNvPr>
@@ -6820,7 +6820,7 @@
           <p:cNvPr id="13" name="Rectangle 12">
             <a:extLst>
               <a:ext uri="{FF2B5EF4-FFF2-40B4-BE49-F238E27FC236}">
-                <a16:creationId xmlns:a16="http://schemas.microsoft.com/office/drawing/2014/main" xmlns="" id="{391AFA4E-7870-4561-A1B8-AC956B0C8931}"/>
+                <a16:creationId xmlns="" xmlns:a16="http://schemas.microsoft.com/office/drawing/2014/main" id="{391AFA4E-7870-4561-A1B8-AC956B0C8931}"/>
               </a:ext>
             </a:extLst>
           </p:cNvPr>
@@ -6901,7 +6901,7 @@
           <p:cNvPr id="3" name="Text Placeholder 2">
             <a:extLst>
               <a:ext uri="{FF2B5EF4-FFF2-40B4-BE49-F238E27FC236}">
-                <a16:creationId xmlns:a16="http://schemas.microsoft.com/office/drawing/2014/main" xmlns="" id="{5A9D2960-6D42-439F-82E8-812822013A10}"/>
+                <a16:creationId xmlns="" xmlns:a16="http://schemas.microsoft.com/office/drawing/2014/main" id="{5A9D2960-6D42-439F-82E8-812822013A10}"/>
               </a:ext>
             </a:extLst>
           </p:cNvPr>
@@ -6964,7 +6964,7 @@
           <p:cNvPr id="6" name="Title 5">
             <a:extLst>
               <a:ext uri="{FF2B5EF4-FFF2-40B4-BE49-F238E27FC236}">
-                <a16:creationId xmlns:a16="http://schemas.microsoft.com/office/drawing/2014/main" xmlns="" id="{19B5B676-7892-440F-8191-7109B2C59885}"/>
+                <a16:creationId xmlns="" xmlns:a16="http://schemas.microsoft.com/office/drawing/2014/main" id="{19B5B676-7892-440F-8191-7109B2C59885}"/>
               </a:ext>
             </a:extLst>
           </p:cNvPr>
@@ -7000,7 +7000,7 @@
           <p:cNvPr id="2" name="Date Placeholder 1">
             <a:extLst>
               <a:ext uri="{FF2B5EF4-FFF2-40B4-BE49-F238E27FC236}">
-                <a16:creationId xmlns:a16="http://schemas.microsoft.com/office/drawing/2014/main" xmlns="" id="{303E2769-FF5C-435B-BEDD-ABA3B8F1B976}"/>
+                <a16:creationId xmlns="" xmlns:a16="http://schemas.microsoft.com/office/drawing/2014/main" id="{303E2769-FF5C-435B-BEDD-ABA3B8F1B976}"/>
               </a:ext>
             </a:extLst>
           </p:cNvPr>
@@ -7019,7 +7019,7 @@
             <a:fld id="{055373AC-9AA7-423B-BA00-BA1C74164DBD}" type="datetime1">
               <a:rPr lang="en-US" smtClean="0"/>
               <a:pPr/>
-              <a:t>9/18/2018</a:t>
+              <a:t>11/2/2018</a:t>
             </a:fld>
             <a:endParaRPr lang="en-US" dirty="0"/>
           </a:p>
@@ -7030,7 +7030,7 @@
           <p:cNvPr id="4" name="Footer Placeholder 3">
             <a:extLst>
               <a:ext uri="{FF2B5EF4-FFF2-40B4-BE49-F238E27FC236}">
-                <a16:creationId xmlns:a16="http://schemas.microsoft.com/office/drawing/2014/main" xmlns="" id="{9CB6AD27-58D7-46FA-99F8-E5BB835ADA68}"/>
+                <a16:creationId xmlns="" xmlns:a16="http://schemas.microsoft.com/office/drawing/2014/main" id="{9CB6AD27-58D7-46FA-99F8-E5BB835ADA68}"/>
               </a:ext>
             </a:extLst>
           </p:cNvPr>
@@ -7055,7 +7055,7 @@
           <p:cNvPr id="5" name="Slide Number Placeholder 4">
             <a:extLst>
               <a:ext uri="{FF2B5EF4-FFF2-40B4-BE49-F238E27FC236}">
-                <a16:creationId xmlns:a16="http://schemas.microsoft.com/office/drawing/2014/main" xmlns="" id="{389DA7C9-2FCE-40EB-BF32-C6983222020F}"/>
+                <a16:creationId xmlns="" xmlns:a16="http://schemas.microsoft.com/office/drawing/2014/main" id="{389DA7C9-2FCE-40EB-BF32-C6983222020F}"/>
               </a:ext>
             </a:extLst>
           </p:cNvPr>
@@ -7085,7 +7085,7 @@
           <p:cNvPr id="11" name="Picture 10">
             <a:extLst>
               <a:ext uri="{FF2B5EF4-FFF2-40B4-BE49-F238E27FC236}">
-                <a16:creationId xmlns:a16="http://schemas.microsoft.com/office/drawing/2014/main" xmlns="" id="{0991B60F-461F-45D1-A35C-8AC3D83E7AD8}"/>
+                <a16:creationId xmlns="" xmlns:a16="http://schemas.microsoft.com/office/drawing/2014/main" id="{0991B60F-461F-45D1-A35C-8AC3D83E7AD8}"/>
               </a:ext>
             </a:extLst>
           </p:cNvPr>
@@ -7160,7 +7160,7 @@
           <p:cNvPr id="11" name="Picture 10">
             <a:extLst>
               <a:ext uri="{FF2B5EF4-FFF2-40B4-BE49-F238E27FC236}">
-                <a16:creationId xmlns:a16="http://schemas.microsoft.com/office/drawing/2014/main" xmlns="" id="{C1E40596-5F7F-41C3-9807-7FA635B42492}"/>
+                <a16:creationId xmlns="" xmlns:a16="http://schemas.microsoft.com/office/drawing/2014/main" id="{C1E40596-5F7F-41C3-9807-7FA635B42492}"/>
               </a:ext>
             </a:extLst>
           </p:cNvPr>
@@ -7189,7 +7189,7 @@
           <p:cNvPr id="7" name="Rectangle 6">
             <a:extLst>
               <a:ext uri="{FF2B5EF4-FFF2-40B4-BE49-F238E27FC236}">
-                <a16:creationId xmlns:a16="http://schemas.microsoft.com/office/drawing/2014/main" xmlns="" id="{C5951C9B-3DEE-4E28-8D4C-55505E0CB6AB}"/>
+                <a16:creationId xmlns="" xmlns:a16="http://schemas.microsoft.com/office/drawing/2014/main" id="{C5951C9B-3DEE-4E28-8D4C-55505E0CB6AB}"/>
               </a:ext>
             </a:extLst>
           </p:cNvPr>
@@ -7270,7 +7270,7 @@
           <p:cNvPr id="9" name="Picture 8" descr="A drawing of a cartoon character&#10;&#10;Description generated with high confidence">
             <a:extLst>
               <a:ext uri="{FF2B5EF4-FFF2-40B4-BE49-F238E27FC236}">
-                <a16:creationId xmlns:a16="http://schemas.microsoft.com/office/drawing/2014/main" xmlns="" id="{DC4365F6-D2C1-47B4-8477-38FD2C7711AA}"/>
+                <a16:creationId xmlns="" xmlns:a16="http://schemas.microsoft.com/office/drawing/2014/main" id="{DC4365F6-D2C1-47B4-8477-38FD2C7711AA}"/>
               </a:ext>
             </a:extLst>
           </p:cNvPr>
@@ -7306,7 +7306,7 @@
           <p:cNvPr id="12" name="Title 11">
             <a:extLst>
               <a:ext uri="{FF2B5EF4-FFF2-40B4-BE49-F238E27FC236}">
-                <a16:creationId xmlns:a16="http://schemas.microsoft.com/office/drawing/2014/main" xmlns="" id="{48CCE616-2FC8-4941-8612-3EC8CFD842E0}"/>
+                <a16:creationId xmlns="" xmlns:a16="http://schemas.microsoft.com/office/drawing/2014/main" id="{48CCE616-2FC8-4941-8612-3EC8CFD842E0}"/>
               </a:ext>
             </a:extLst>
           </p:cNvPr>
@@ -7342,7 +7342,7 @@
           <p:cNvPr id="23" name="Text Placeholder 22">
             <a:extLst>
               <a:ext uri="{FF2B5EF4-FFF2-40B4-BE49-F238E27FC236}">
-                <a16:creationId xmlns:a16="http://schemas.microsoft.com/office/drawing/2014/main" xmlns="" id="{889D93F4-ABFA-46BF-8E5D-FE6562ACB20F}"/>
+                <a16:creationId xmlns="" xmlns:a16="http://schemas.microsoft.com/office/drawing/2014/main" id="{889D93F4-ABFA-46BF-8E5D-FE6562ACB20F}"/>
               </a:ext>
             </a:extLst>
           </p:cNvPr>
@@ -7401,7 +7401,7 @@
           <p:cNvPr id="10" name="Picture 9">
             <a:extLst>
               <a:ext uri="{FF2B5EF4-FFF2-40B4-BE49-F238E27FC236}">
-                <a16:creationId xmlns:a16="http://schemas.microsoft.com/office/drawing/2014/main" xmlns="" id="{DF7D6D63-C0D2-4213-B1FA-96890BDE6C03}"/>
+                <a16:creationId xmlns="" xmlns:a16="http://schemas.microsoft.com/office/drawing/2014/main" id="{DF7D6D63-C0D2-4213-B1FA-96890BDE6C03}"/>
               </a:ext>
             </a:extLst>
           </p:cNvPr>
@@ -7437,7 +7437,7 @@
           <p:cNvPr id="14" name="Date Placeholder 13">
             <a:extLst>
               <a:ext uri="{FF2B5EF4-FFF2-40B4-BE49-F238E27FC236}">
-                <a16:creationId xmlns:a16="http://schemas.microsoft.com/office/drawing/2014/main" xmlns="" id="{0AA6AF62-9F6D-4B1C-831C-72AACA29F786}"/>
+                <a16:creationId xmlns="" xmlns:a16="http://schemas.microsoft.com/office/drawing/2014/main" id="{0AA6AF62-9F6D-4B1C-831C-72AACA29F786}"/>
               </a:ext>
             </a:extLst>
           </p:cNvPr>
@@ -7456,7 +7456,7 @@
             <a:fld id="{055373AC-9AA7-423B-BA00-BA1C74164DBD}" type="datetime1">
               <a:rPr lang="en-US" smtClean="0"/>
               <a:pPr/>
-              <a:t>9/18/2018</a:t>
+              <a:t>11/2/2018</a:t>
             </a:fld>
             <a:endParaRPr lang="en-US" dirty="0"/>
           </a:p>
@@ -7467,7 +7467,7 @@
           <p:cNvPr id="15" name="Footer Placeholder 14">
             <a:extLst>
               <a:ext uri="{FF2B5EF4-FFF2-40B4-BE49-F238E27FC236}">
-                <a16:creationId xmlns:a16="http://schemas.microsoft.com/office/drawing/2014/main" xmlns="" id="{D92A8ED8-1E91-4F87-9AAB-0B939CA64F66}"/>
+                <a16:creationId xmlns="" xmlns:a16="http://schemas.microsoft.com/office/drawing/2014/main" id="{D92A8ED8-1E91-4F87-9AAB-0B939CA64F66}"/>
               </a:ext>
             </a:extLst>
           </p:cNvPr>
@@ -7492,7 +7492,7 @@
           <p:cNvPr id="16" name="Slide Number Placeholder 15">
             <a:extLst>
               <a:ext uri="{FF2B5EF4-FFF2-40B4-BE49-F238E27FC236}">
-                <a16:creationId xmlns:a16="http://schemas.microsoft.com/office/drawing/2014/main" xmlns="" id="{37E4C518-B0B3-4716-AB97-AC8ECA4F7C84}"/>
+                <a16:creationId xmlns="" xmlns:a16="http://schemas.microsoft.com/office/drawing/2014/main" id="{37E4C518-B0B3-4716-AB97-AC8ECA4F7C84}"/>
               </a:ext>
             </a:extLst>
           </p:cNvPr>
@@ -7561,7 +7561,7 @@
           <p:cNvPr id="6" name="Picture 5">
             <a:extLst>
               <a:ext uri="{FF2B5EF4-FFF2-40B4-BE49-F238E27FC236}">
-                <a16:creationId xmlns:a16="http://schemas.microsoft.com/office/drawing/2014/main" xmlns="" id="{455D431A-1BDA-40DB-B7D8-23653331B7C3}"/>
+                <a16:creationId xmlns="" xmlns:a16="http://schemas.microsoft.com/office/drawing/2014/main" id="{455D431A-1BDA-40DB-B7D8-23653331B7C3}"/>
               </a:ext>
             </a:extLst>
           </p:cNvPr>
@@ -7795,7 +7795,7 @@
           <p:cNvPr id="16" name="Picture 15">
             <a:extLst>
               <a:ext uri="{FF2B5EF4-FFF2-40B4-BE49-F238E27FC236}">
-                <a16:creationId xmlns:a16="http://schemas.microsoft.com/office/drawing/2014/main" xmlns="" id="{B0FF4B1E-24EA-407C-BFA6-24CCB6D4409A}"/>
+                <a16:creationId xmlns="" xmlns:a16="http://schemas.microsoft.com/office/drawing/2014/main" id="{B0FF4B1E-24EA-407C-BFA6-24CCB6D4409A}"/>
               </a:ext>
             </a:extLst>
           </p:cNvPr>
@@ -7979,7 +7979,7 @@
           <p:cNvPr id="7" name="Text Placeholder 6">
             <a:extLst>
               <a:ext uri="{FF2B5EF4-FFF2-40B4-BE49-F238E27FC236}">
-                <a16:creationId xmlns:a16="http://schemas.microsoft.com/office/drawing/2014/main" xmlns="" id="{CB4CB13C-66A1-466B-A6C1-B0BABF5CFEC1}"/>
+                <a16:creationId xmlns="" xmlns:a16="http://schemas.microsoft.com/office/drawing/2014/main" id="{CB4CB13C-66A1-466B-A6C1-B0BABF5CFEC1}"/>
               </a:ext>
             </a:extLst>
           </p:cNvPr>
@@ -8078,7 +8078,7 @@
           <p:cNvPr id="12" name="Title 11">
             <a:extLst>
               <a:ext uri="{FF2B5EF4-FFF2-40B4-BE49-F238E27FC236}">
-                <a16:creationId xmlns:a16="http://schemas.microsoft.com/office/drawing/2014/main" xmlns="" id="{4ED30444-7448-455E-ACFD-2D8F93C93971}"/>
+                <a16:creationId xmlns="" xmlns:a16="http://schemas.microsoft.com/office/drawing/2014/main" id="{4ED30444-7448-455E-ACFD-2D8F93C93971}"/>
               </a:ext>
             </a:extLst>
           </p:cNvPr>
@@ -8115,7 +8115,7 @@
           <p:cNvPr id="15" name="Picture 14">
             <a:extLst>
               <a:ext uri="{FF2B5EF4-FFF2-40B4-BE49-F238E27FC236}">
-                <a16:creationId xmlns:a16="http://schemas.microsoft.com/office/drawing/2014/main" xmlns="" id="{00505D47-5EAF-4709-A366-B1437B044AC8}"/>
+                <a16:creationId xmlns="" xmlns:a16="http://schemas.microsoft.com/office/drawing/2014/main" id="{00505D47-5EAF-4709-A366-B1437B044AC8}"/>
               </a:ext>
             </a:extLst>
           </p:cNvPr>
@@ -8151,7 +8151,7 @@
           <p:cNvPr id="8" name="Date Placeholder 7">
             <a:extLst>
               <a:ext uri="{FF2B5EF4-FFF2-40B4-BE49-F238E27FC236}">
-                <a16:creationId xmlns:a16="http://schemas.microsoft.com/office/drawing/2014/main" xmlns="" id="{CF9A2DC4-5280-4E93-B6D2-9709FE6D0627}"/>
+                <a16:creationId xmlns="" xmlns:a16="http://schemas.microsoft.com/office/drawing/2014/main" id="{CF9A2DC4-5280-4E93-B6D2-9709FE6D0627}"/>
               </a:ext>
             </a:extLst>
           </p:cNvPr>
@@ -8170,7 +8170,7 @@
             <a:fld id="{055373AC-9AA7-423B-BA00-BA1C74164DBD}" type="datetime1">
               <a:rPr lang="en-US" smtClean="0"/>
               <a:pPr/>
-              <a:t>9/18/2018</a:t>
+              <a:t>11/2/2018</a:t>
             </a:fld>
             <a:endParaRPr lang="en-US" dirty="0"/>
           </a:p>
@@ -8181,7 +8181,7 @@
           <p:cNvPr id="10" name="Footer Placeholder 9">
             <a:extLst>
               <a:ext uri="{FF2B5EF4-FFF2-40B4-BE49-F238E27FC236}">
-                <a16:creationId xmlns:a16="http://schemas.microsoft.com/office/drawing/2014/main" xmlns="" id="{FA4C1EE0-8040-49CB-9319-CF991DE7B325}"/>
+                <a16:creationId xmlns="" xmlns:a16="http://schemas.microsoft.com/office/drawing/2014/main" id="{FA4C1EE0-8040-49CB-9319-CF991DE7B325}"/>
               </a:ext>
             </a:extLst>
           </p:cNvPr>
@@ -8206,7 +8206,7 @@
           <p:cNvPr id="17" name="Slide Number Placeholder 16">
             <a:extLst>
               <a:ext uri="{FF2B5EF4-FFF2-40B4-BE49-F238E27FC236}">
-                <a16:creationId xmlns:a16="http://schemas.microsoft.com/office/drawing/2014/main" xmlns="" id="{1643825A-6B67-4224-B077-B526FC2A4C74}"/>
+                <a16:creationId xmlns="" xmlns:a16="http://schemas.microsoft.com/office/drawing/2014/main" id="{1643825A-6B67-4224-B077-B526FC2A4C74}"/>
               </a:ext>
             </a:extLst>
           </p:cNvPr>
@@ -8275,7 +8275,7 @@
           <p:cNvPr id="17" name="Picture 16">
             <a:extLst>
               <a:ext uri="{FF2B5EF4-FFF2-40B4-BE49-F238E27FC236}">
-                <a16:creationId xmlns:a16="http://schemas.microsoft.com/office/drawing/2014/main" xmlns="" id="{3DA6B0AA-1988-451B-88D4-0F726295570B}"/>
+                <a16:creationId xmlns="" xmlns:a16="http://schemas.microsoft.com/office/drawing/2014/main" id="{3DA6B0AA-1988-451B-88D4-0F726295570B}"/>
               </a:ext>
             </a:extLst>
           </p:cNvPr>
@@ -8304,7 +8304,7 @@
           <p:cNvPr id="12" name="Rectangle 11">
             <a:extLst>
               <a:ext uri="{FF2B5EF4-FFF2-40B4-BE49-F238E27FC236}">
-                <a16:creationId xmlns:a16="http://schemas.microsoft.com/office/drawing/2014/main" xmlns="" id="{345FB1C8-7F66-4D5C-ACCE-AE919936BCFD}"/>
+                <a16:creationId xmlns="" xmlns:a16="http://schemas.microsoft.com/office/drawing/2014/main" id="{345FB1C8-7F66-4D5C-ACCE-AE919936BCFD}"/>
               </a:ext>
             </a:extLst>
           </p:cNvPr>
@@ -8426,7 +8426,7 @@
           <p:cNvPr id="13" name="Title 11">
             <a:extLst>
               <a:ext uri="{FF2B5EF4-FFF2-40B4-BE49-F238E27FC236}">
-                <a16:creationId xmlns:a16="http://schemas.microsoft.com/office/drawing/2014/main" xmlns="" id="{0D5CC956-5C4A-44BE-8F8B-327FAFA51E97}"/>
+                <a16:creationId xmlns="" xmlns:a16="http://schemas.microsoft.com/office/drawing/2014/main" id="{0D5CC956-5C4A-44BE-8F8B-327FAFA51E97}"/>
               </a:ext>
             </a:extLst>
           </p:cNvPr>
@@ -8463,7 +8463,7 @@
           <p:cNvPr id="15" name="Text Placeholder 6">
             <a:extLst>
               <a:ext uri="{FF2B5EF4-FFF2-40B4-BE49-F238E27FC236}">
-                <a16:creationId xmlns:a16="http://schemas.microsoft.com/office/drawing/2014/main" xmlns="" id="{6157C8DE-E0AF-422B-BBB1-F0AF1264B5E9}"/>
+                <a16:creationId xmlns="" xmlns:a16="http://schemas.microsoft.com/office/drawing/2014/main" id="{6157C8DE-E0AF-422B-BBB1-F0AF1264B5E9}"/>
               </a:ext>
             </a:extLst>
           </p:cNvPr>
@@ -8562,7 +8562,7 @@
           <p:cNvPr id="2" name="Date Placeholder 1">
             <a:extLst>
               <a:ext uri="{FF2B5EF4-FFF2-40B4-BE49-F238E27FC236}">
-                <a16:creationId xmlns:a16="http://schemas.microsoft.com/office/drawing/2014/main" xmlns="" id="{3FF2A4EF-FDC7-4D65-91A0-D3473057251B}"/>
+                <a16:creationId xmlns="" xmlns:a16="http://schemas.microsoft.com/office/drawing/2014/main" id="{3FF2A4EF-FDC7-4D65-91A0-D3473057251B}"/>
               </a:ext>
             </a:extLst>
           </p:cNvPr>
@@ -8581,7 +8581,7 @@
             <a:fld id="{055373AC-9AA7-423B-BA00-BA1C74164DBD}" type="datetime1">
               <a:rPr lang="en-US" smtClean="0"/>
               <a:pPr/>
-              <a:t>9/18/2018</a:t>
+              <a:t>11/2/2018</a:t>
             </a:fld>
             <a:endParaRPr lang="en-US" dirty="0"/>
           </a:p>
@@ -8592,7 +8592,7 @@
           <p:cNvPr id="3" name="Footer Placeholder 2">
             <a:extLst>
               <a:ext uri="{FF2B5EF4-FFF2-40B4-BE49-F238E27FC236}">
-                <a16:creationId xmlns:a16="http://schemas.microsoft.com/office/drawing/2014/main" xmlns="" id="{2AD0B15D-022F-4B93-A0E6-6FC062C18AF1}"/>
+                <a16:creationId xmlns="" xmlns:a16="http://schemas.microsoft.com/office/drawing/2014/main" id="{2AD0B15D-022F-4B93-A0E6-6FC062C18AF1}"/>
               </a:ext>
             </a:extLst>
           </p:cNvPr>
@@ -8617,7 +8617,7 @@
           <p:cNvPr id="4" name="Slide Number Placeholder 3">
             <a:extLst>
               <a:ext uri="{FF2B5EF4-FFF2-40B4-BE49-F238E27FC236}">
-                <a16:creationId xmlns:a16="http://schemas.microsoft.com/office/drawing/2014/main" xmlns="" id="{72845B5C-C9D2-4885-BBE1-AE0D4F570CBF}"/>
+                <a16:creationId xmlns="" xmlns:a16="http://schemas.microsoft.com/office/drawing/2014/main" id="{72845B5C-C9D2-4885-BBE1-AE0D4F570CBF}"/>
               </a:ext>
             </a:extLst>
           </p:cNvPr>
@@ -8647,7 +8647,7 @@
           <p:cNvPr id="11" name="Picture 10">
             <a:extLst>
               <a:ext uri="{FF2B5EF4-FFF2-40B4-BE49-F238E27FC236}">
-                <a16:creationId xmlns:a16="http://schemas.microsoft.com/office/drawing/2014/main" xmlns="" id="{A1E6AED5-8603-4881-90EA-963A2A5A2C03}"/>
+                <a16:creationId xmlns="" xmlns:a16="http://schemas.microsoft.com/office/drawing/2014/main" id="{A1E6AED5-8603-4881-90EA-963A2A5A2C03}"/>
               </a:ext>
             </a:extLst>
           </p:cNvPr>
@@ -8722,7 +8722,7 @@
           <p:cNvPr id="10" name="Picture 9">
             <a:extLst>
               <a:ext uri="{FF2B5EF4-FFF2-40B4-BE49-F238E27FC236}">
-                <a16:creationId xmlns:a16="http://schemas.microsoft.com/office/drawing/2014/main" xmlns="" id="{89AD94B5-9922-4E42-89CE-3C445EFB152E}"/>
+                <a16:creationId xmlns="" xmlns:a16="http://schemas.microsoft.com/office/drawing/2014/main" id="{89AD94B5-9922-4E42-89CE-3C445EFB152E}"/>
               </a:ext>
             </a:extLst>
           </p:cNvPr>
@@ -8751,7 +8751,7 @@
           <p:cNvPr id="13" name="Rectangle 12">
             <a:extLst>
               <a:ext uri="{FF2B5EF4-FFF2-40B4-BE49-F238E27FC236}">
-                <a16:creationId xmlns:a16="http://schemas.microsoft.com/office/drawing/2014/main" xmlns="" id="{391AFA4E-7870-4561-A1B8-AC956B0C8931}"/>
+                <a16:creationId xmlns="" xmlns:a16="http://schemas.microsoft.com/office/drawing/2014/main" id="{391AFA4E-7870-4561-A1B8-AC956B0C8931}"/>
               </a:ext>
             </a:extLst>
           </p:cNvPr>
@@ -8832,7 +8832,7 @@
           <p:cNvPr id="3" name="Text Placeholder 2">
             <a:extLst>
               <a:ext uri="{FF2B5EF4-FFF2-40B4-BE49-F238E27FC236}">
-                <a16:creationId xmlns:a16="http://schemas.microsoft.com/office/drawing/2014/main" xmlns="" id="{5A9D2960-6D42-439F-82E8-812822013A10}"/>
+                <a16:creationId xmlns="" xmlns:a16="http://schemas.microsoft.com/office/drawing/2014/main" id="{5A9D2960-6D42-439F-82E8-812822013A10}"/>
               </a:ext>
             </a:extLst>
           </p:cNvPr>
@@ -8895,7 +8895,7 @@
           <p:cNvPr id="6" name="Title 5">
             <a:extLst>
               <a:ext uri="{FF2B5EF4-FFF2-40B4-BE49-F238E27FC236}">
-                <a16:creationId xmlns:a16="http://schemas.microsoft.com/office/drawing/2014/main" xmlns="" id="{19B5B676-7892-440F-8191-7109B2C59885}"/>
+                <a16:creationId xmlns="" xmlns:a16="http://schemas.microsoft.com/office/drawing/2014/main" id="{19B5B676-7892-440F-8191-7109B2C59885}"/>
               </a:ext>
             </a:extLst>
           </p:cNvPr>
@@ -8931,7 +8931,7 @@
           <p:cNvPr id="2" name="Date Placeholder 1">
             <a:extLst>
               <a:ext uri="{FF2B5EF4-FFF2-40B4-BE49-F238E27FC236}">
-                <a16:creationId xmlns:a16="http://schemas.microsoft.com/office/drawing/2014/main" xmlns="" id="{303E2769-FF5C-435B-BEDD-ABA3B8F1B976}"/>
+                <a16:creationId xmlns="" xmlns:a16="http://schemas.microsoft.com/office/drawing/2014/main" id="{303E2769-FF5C-435B-BEDD-ABA3B8F1B976}"/>
               </a:ext>
             </a:extLst>
           </p:cNvPr>
@@ -8950,7 +8950,7 @@
             <a:fld id="{055373AC-9AA7-423B-BA00-BA1C74164DBD}" type="datetime1">
               <a:rPr lang="en-US" smtClean="0"/>
               <a:pPr/>
-              <a:t>9/18/2018</a:t>
+              <a:t>11/2/2018</a:t>
             </a:fld>
             <a:endParaRPr lang="en-US" dirty="0"/>
           </a:p>
@@ -8961,7 +8961,7 @@
           <p:cNvPr id="4" name="Footer Placeholder 3">
             <a:extLst>
               <a:ext uri="{FF2B5EF4-FFF2-40B4-BE49-F238E27FC236}">
-                <a16:creationId xmlns:a16="http://schemas.microsoft.com/office/drawing/2014/main" xmlns="" id="{9CB6AD27-58D7-46FA-99F8-E5BB835ADA68}"/>
+                <a16:creationId xmlns="" xmlns:a16="http://schemas.microsoft.com/office/drawing/2014/main" id="{9CB6AD27-58D7-46FA-99F8-E5BB835ADA68}"/>
               </a:ext>
             </a:extLst>
           </p:cNvPr>
@@ -8986,7 +8986,7 @@
           <p:cNvPr id="5" name="Slide Number Placeholder 4">
             <a:extLst>
               <a:ext uri="{FF2B5EF4-FFF2-40B4-BE49-F238E27FC236}">
-                <a16:creationId xmlns:a16="http://schemas.microsoft.com/office/drawing/2014/main" xmlns="" id="{389DA7C9-2FCE-40EB-BF32-C6983222020F}"/>
+                <a16:creationId xmlns="" xmlns:a16="http://schemas.microsoft.com/office/drawing/2014/main" id="{389DA7C9-2FCE-40EB-BF32-C6983222020F}"/>
               </a:ext>
             </a:extLst>
           </p:cNvPr>
@@ -9016,7 +9016,7 @@
           <p:cNvPr id="11" name="Picture 10">
             <a:extLst>
               <a:ext uri="{FF2B5EF4-FFF2-40B4-BE49-F238E27FC236}">
-                <a16:creationId xmlns:a16="http://schemas.microsoft.com/office/drawing/2014/main" xmlns="" id="{0991B60F-461F-45D1-A35C-8AC3D83E7AD8}"/>
+                <a16:creationId xmlns="" xmlns:a16="http://schemas.microsoft.com/office/drawing/2014/main" id="{0991B60F-461F-45D1-A35C-8AC3D83E7AD8}"/>
               </a:ext>
             </a:extLst>
           </p:cNvPr>
@@ -9129,7 +9129,7 @@
           <p:cNvPr id="14" name="Picture 13">
             <a:extLst>
               <a:ext uri="{FF2B5EF4-FFF2-40B4-BE49-F238E27FC236}">
-                <a16:creationId xmlns:a16="http://schemas.microsoft.com/office/drawing/2014/main" xmlns="" id="{79D60504-DA9E-4357-9A0A-15E333FC2783}"/>
+                <a16:creationId xmlns="" xmlns:a16="http://schemas.microsoft.com/office/drawing/2014/main" id="{79D60504-DA9E-4357-9A0A-15E333FC2783}"/>
               </a:ext>
             </a:extLst>
           </p:cNvPr>
@@ -9158,7 +9158,7 @@
           <p:cNvPr id="13" name="Rectangle 12">
             <a:extLst>
               <a:ext uri="{FF2B5EF4-FFF2-40B4-BE49-F238E27FC236}">
-                <a16:creationId xmlns:a16="http://schemas.microsoft.com/office/drawing/2014/main" xmlns="" id="{57B03959-5ED4-4593-8CEF-2AE1A73775F5}"/>
+                <a16:creationId xmlns="" xmlns:a16="http://schemas.microsoft.com/office/drawing/2014/main" id="{57B03959-5ED4-4593-8CEF-2AE1A73775F5}"/>
               </a:ext>
             </a:extLst>
           </p:cNvPr>
@@ -9396,7 +9396,7 @@
           <p:cNvPr id="6" name="Title 5">
             <a:extLst>
               <a:ext uri="{FF2B5EF4-FFF2-40B4-BE49-F238E27FC236}">
-                <a16:creationId xmlns:a16="http://schemas.microsoft.com/office/drawing/2014/main" xmlns="" id="{38A09987-8827-47B7-85D3-6D69487FC731}"/>
+                <a16:creationId xmlns="" xmlns:a16="http://schemas.microsoft.com/office/drawing/2014/main" id="{38A09987-8827-47B7-85D3-6D69487FC731}"/>
               </a:ext>
             </a:extLst>
           </p:cNvPr>
@@ -9432,7 +9432,7 @@
           <p:cNvPr id="12" name="Picture 11">
             <a:extLst>
               <a:ext uri="{FF2B5EF4-FFF2-40B4-BE49-F238E27FC236}">
-                <a16:creationId xmlns:a16="http://schemas.microsoft.com/office/drawing/2014/main" xmlns="" id="{7028D2F0-1E67-414B-A93D-D3F8F131A132}"/>
+                <a16:creationId xmlns="" xmlns:a16="http://schemas.microsoft.com/office/drawing/2014/main" id="{7028D2F0-1E67-414B-A93D-D3F8F131A132}"/>
               </a:ext>
             </a:extLst>
           </p:cNvPr>
@@ -9468,7 +9468,7 @@
           <p:cNvPr id="9" name="Text Placeholder 2">
             <a:extLst>
               <a:ext uri="{FF2B5EF4-FFF2-40B4-BE49-F238E27FC236}">
-                <a16:creationId xmlns:a16="http://schemas.microsoft.com/office/drawing/2014/main" xmlns="" id="{C8A626D2-456B-41EF-9818-EA8DD7E314DA}"/>
+                <a16:creationId xmlns="" xmlns:a16="http://schemas.microsoft.com/office/drawing/2014/main" id="{C8A626D2-456B-41EF-9818-EA8DD7E314DA}"/>
               </a:ext>
             </a:extLst>
           </p:cNvPr>
@@ -9531,7 +9531,7 @@
           <p:cNvPr id="10" name="Text Placeholder 2">
             <a:extLst>
               <a:ext uri="{FF2B5EF4-FFF2-40B4-BE49-F238E27FC236}">
-                <a16:creationId xmlns:a16="http://schemas.microsoft.com/office/drawing/2014/main" xmlns="" id="{AF69A59F-C564-4A04-B1CC-31C261499991}"/>
+                <a16:creationId xmlns="" xmlns:a16="http://schemas.microsoft.com/office/drawing/2014/main" id="{AF69A59F-C564-4A04-B1CC-31C261499991}"/>
               </a:ext>
             </a:extLst>
           </p:cNvPr>
@@ -9594,7 +9594,7 @@
           <p:cNvPr id="5" name="Date Placeholder 4">
             <a:extLst>
               <a:ext uri="{FF2B5EF4-FFF2-40B4-BE49-F238E27FC236}">
-                <a16:creationId xmlns:a16="http://schemas.microsoft.com/office/drawing/2014/main" xmlns="" id="{F858E34E-73A2-41B4-8C58-4DDB1D4D97D8}"/>
+                <a16:creationId xmlns="" xmlns:a16="http://schemas.microsoft.com/office/drawing/2014/main" id="{F858E34E-73A2-41B4-8C58-4DDB1D4D97D8}"/>
               </a:ext>
             </a:extLst>
           </p:cNvPr>
@@ -9618,7 +9618,7 @@
             <a:fld id="{055373AC-9AA7-423B-BA00-BA1C74164DBD}" type="datetime1">
               <a:rPr lang="en-US" smtClean="0"/>
               <a:pPr/>
-              <a:t>9/18/2018</a:t>
+              <a:t>11/2/2018</a:t>
             </a:fld>
             <a:endParaRPr lang="en-US" dirty="0"/>
           </a:p>
@@ -9629,7 +9629,7 @@
           <p:cNvPr id="7" name="Footer Placeholder 6">
             <a:extLst>
               <a:ext uri="{FF2B5EF4-FFF2-40B4-BE49-F238E27FC236}">
-                <a16:creationId xmlns:a16="http://schemas.microsoft.com/office/drawing/2014/main" xmlns="" id="{47141AFF-42FF-4AAA-A3FA-149DDA66FCC2}"/>
+                <a16:creationId xmlns="" xmlns:a16="http://schemas.microsoft.com/office/drawing/2014/main" id="{47141AFF-42FF-4AAA-A3FA-149DDA66FCC2}"/>
               </a:ext>
             </a:extLst>
           </p:cNvPr>
@@ -9654,7 +9654,7 @@
           <p:cNvPr id="8" name="Slide Number Placeholder 7">
             <a:extLst>
               <a:ext uri="{FF2B5EF4-FFF2-40B4-BE49-F238E27FC236}">
-                <a16:creationId xmlns:a16="http://schemas.microsoft.com/office/drawing/2014/main" xmlns="" id="{92B2616D-7BC8-4F96-B3A7-B299A353B427}"/>
+                <a16:creationId xmlns="" xmlns:a16="http://schemas.microsoft.com/office/drawing/2014/main" id="{92B2616D-7BC8-4F96-B3A7-B299A353B427}"/>
               </a:ext>
             </a:extLst>
           </p:cNvPr>
@@ -9692,7 +9692,7 @@
           <p:cNvPr id="15" name="Picture 14">
             <a:extLst>
               <a:ext uri="{FF2B5EF4-FFF2-40B4-BE49-F238E27FC236}">
-                <a16:creationId xmlns:a16="http://schemas.microsoft.com/office/drawing/2014/main" xmlns="" id="{23AACB49-5E4F-4436-9D82-E83B52A7FCB8}"/>
+                <a16:creationId xmlns="" xmlns:a16="http://schemas.microsoft.com/office/drawing/2014/main" id="{23AACB49-5E4F-4436-9D82-E83B52A7FCB8}"/>
               </a:ext>
             </a:extLst>
           </p:cNvPr>
@@ -9744,7 +9744,7 @@
   <p:hf hdr="0" ftr="0" dt="0"/>
   <p:extLst mod="1">
     <p:ext uri="{DCECCB84-F9BA-43D5-87BE-67443E8EF086}">
-      <p15:sldGuideLst xmlns:p15="http://schemas.microsoft.com/office/powerpoint/2012/main" xmlns="">
+      <p15:sldGuideLst xmlns="" xmlns:p15="http://schemas.microsoft.com/office/powerpoint/2012/main">
         <p15:guide id="1" orient="horz" pos="2160">
           <p15:clr>
             <a:srgbClr val="FBAE40"/>
@@ -9783,7 +9783,7 @@
           <p:cNvPr id="15" name="Picture 14">
             <a:extLst>
               <a:ext uri="{FF2B5EF4-FFF2-40B4-BE49-F238E27FC236}">
-                <a16:creationId xmlns:a16="http://schemas.microsoft.com/office/drawing/2014/main" xmlns="" id="{C19C6415-13AB-4677-935E-D11508C4AD27}"/>
+                <a16:creationId xmlns="" xmlns:a16="http://schemas.microsoft.com/office/drawing/2014/main" id="{C19C6415-13AB-4677-935E-D11508C4AD27}"/>
               </a:ext>
             </a:extLst>
           </p:cNvPr>
@@ -9812,7 +9812,7 @@
           <p:cNvPr id="13" name="Rectangle 12">
             <a:extLst>
               <a:ext uri="{FF2B5EF4-FFF2-40B4-BE49-F238E27FC236}">
-                <a16:creationId xmlns:a16="http://schemas.microsoft.com/office/drawing/2014/main" xmlns="" id="{4B4EBD86-A13A-41DF-A04E-EA4A858E8860}"/>
+                <a16:creationId xmlns="" xmlns:a16="http://schemas.microsoft.com/office/drawing/2014/main" id="{4B4EBD86-A13A-41DF-A04E-EA4A858E8860}"/>
               </a:ext>
             </a:extLst>
           </p:cNvPr>
@@ -9893,7 +9893,7 @@
           <p:cNvPr id="21" name="Text Placeholder 20">
             <a:extLst>
               <a:ext uri="{FF2B5EF4-FFF2-40B4-BE49-F238E27FC236}">
-                <a16:creationId xmlns:a16="http://schemas.microsoft.com/office/drawing/2014/main" xmlns="" id="{04F318BE-2BAD-4677-871C-D78A4BF0CBA6}"/>
+                <a16:creationId xmlns="" xmlns:a16="http://schemas.microsoft.com/office/drawing/2014/main" id="{04F318BE-2BAD-4677-871C-D78A4BF0CBA6}"/>
               </a:ext>
             </a:extLst>
           </p:cNvPr>
@@ -9941,7 +9941,7 @@
           <p:cNvPr id="6" name="Text Placeholder 5">
             <a:extLst>
               <a:ext uri="{FF2B5EF4-FFF2-40B4-BE49-F238E27FC236}">
-                <a16:creationId xmlns:a16="http://schemas.microsoft.com/office/drawing/2014/main" xmlns="" id="{3278A82F-5546-4977-9F75-2A933B415945}"/>
+                <a16:creationId xmlns="" xmlns:a16="http://schemas.microsoft.com/office/drawing/2014/main" id="{3278A82F-5546-4977-9F75-2A933B415945}"/>
               </a:ext>
             </a:extLst>
           </p:cNvPr>
@@ -10024,7 +10024,7 @@
           <p:cNvPr id="2" name="Title 1">
             <a:extLst>
               <a:ext uri="{FF2B5EF4-FFF2-40B4-BE49-F238E27FC236}">
-                <a16:creationId xmlns:a16="http://schemas.microsoft.com/office/drawing/2014/main" xmlns="" id="{03BA3E62-7E9B-447C-9045-B989874D05D3}"/>
+                <a16:creationId xmlns="" xmlns:a16="http://schemas.microsoft.com/office/drawing/2014/main" id="{03BA3E62-7E9B-447C-9045-B989874D05D3}"/>
               </a:ext>
             </a:extLst>
           </p:cNvPr>
@@ -10060,7 +10060,7 @@
           <p:cNvPr id="3" name="Date Placeholder 2">
             <a:extLst>
               <a:ext uri="{FF2B5EF4-FFF2-40B4-BE49-F238E27FC236}">
-                <a16:creationId xmlns:a16="http://schemas.microsoft.com/office/drawing/2014/main" xmlns="" id="{1557BD22-7B02-4D39-928A-4BAD0D84EC13}"/>
+                <a16:creationId xmlns="" xmlns:a16="http://schemas.microsoft.com/office/drawing/2014/main" id="{1557BD22-7B02-4D39-928A-4BAD0D84EC13}"/>
               </a:ext>
             </a:extLst>
           </p:cNvPr>
@@ -10079,7 +10079,7 @@
             <a:fld id="{055373AC-9AA7-423B-BA00-BA1C74164DBD}" type="datetime1">
               <a:rPr lang="en-US" smtClean="0"/>
               <a:pPr/>
-              <a:t>9/18/2018</a:t>
+              <a:t>11/2/2018</a:t>
             </a:fld>
             <a:endParaRPr lang="en-US" dirty="0"/>
           </a:p>
@@ -10090,7 +10090,7 @@
           <p:cNvPr id="4" name="Footer Placeholder 3">
             <a:extLst>
               <a:ext uri="{FF2B5EF4-FFF2-40B4-BE49-F238E27FC236}">
-                <a16:creationId xmlns:a16="http://schemas.microsoft.com/office/drawing/2014/main" xmlns="" id="{12DED1B3-84A5-43D8-8770-B2C1E963B681}"/>
+                <a16:creationId xmlns="" xmlns:a16="http://schemas.microsoft.com/office/drawing/2014/main" id="{12DED1B3-84A5-43D8-8770-B2C1E963B681}"/>
               </a:ext>
             </a:extLst>
           </p:cNvPr>
@@ -10115,7 +10115,7 @@
           <p:cNvPr id="5" name="Slide Number Placeholder 4">
             <a:extLst>
               <a:ext uri="{FF2B5EF4-FFF2-40B4-BE49-F238E27FC236}">
-                <a16:creationId xmlns:a16="http://schemas.microsoft.com/office/drawing/2014/main" xmlns="" id="{6213FF9B-335F-4699-94F7-E43CA829037E}"/>
+                <a16:creationId xmlns="" xmlns:a16="http://schemas.microsoft.com/office/drawing/2014/main" id="{6213FF9B-335F-4699-94F7-E43CA829037E}"/>
               </a:ext>
             </a:extLst>
           </p:cNvPr>
@@ -10145,7 +10145,7 @@
           <p:cNvPr id="11" name="Picture 10">
             <a:extLst>
               <a:ext uri="{FF2B5EF4-FFF2-40B4-BE49-F238E27FC236}">
-                <a16:creationId xmlns:a16="http://schemas.microsoft.com/office/drawing/2014/main" xmlns="" id="{2EB003D1-D2F8-474E-9E8E-075BE60E9273}"/>
+                <a16:creationId xmlns="" xmlns:a16="http://schemas.microsoft.com/office/drawing/2014/main" id="{2EB003D1-D2F8-474E-9E8E-075BE60E9273}"/>
               </a:ext>
             </a:extLst>
           </p:cNvPr>
@@ -10228,7 +10228,7 @@
           <p:cNvPr id="7" name="Date Placeholder 3">
             <a:extLst>
               <a:ext uri="{FF2B5EF4-FFF2-40B4-BE49-F238E27FC236}">
-                <a16:creationId xmlns:a16="http://schemas.microsoft.com/office/drawing/2014/main" xmlns="" id="{0403F5F2-BA1B-4A39-A03D-AD9E0469441C}"/>
+                <a16:creationId xmlns="" xmlns:a16="http://schemas.microsoft.com/office/drawing/2014/main" id="{0403F5F2-BA1B-4A39-A03D-AD9E0469441C}"/>
               </a:ext>
             </a:extLst>
           </p:cNvPr>
@@ -10263,7 +10263,7 @@
             <a:fld id="{055373AC-9AA7-423B-BA00-BA1C74164DBD}" type="datetime1">
               <a:rPr lang="en-US" smtClean="0"/>
               <a:pPr/>
-              <a:t>9/18/2018</a:t>
+              <a:t>11/2/2018</a:t>
             </a:fld>
             <a:endParaRPr lang="en-US" dirty="0"/>
           </a:p>
@@ -10274,7 +10274,7 @@
           <p:cNvPr id="8" name="Footer Placeholder 4">
             <a:extLst>
               <a:ext uri="{FF2B5EF4-FFF2-40B4-BE49-F238E27FC236}">
-                <a16:creationId xmlns:a16="http://schemas.microsoft.com/office/drawing/2014/main" xmlns="" id="{32BCD1B1-3A00-45B1-B516-6B8E7FBC47C4}"/>
+                <a16:creationId xmlns="" xmlns:a16="http://schemas.microsoft.com/office/drawing/2014/main" id="{32BCD1B1-3A00-45B1-B516-6B8E7FBC47C4}"/>
               </a:ext>
             </a:extLst>
           </p:cNvPr>
@@ -10315,7 +10315,7 @@
           <p:cNvPr id="9" name="Slide Number Placeholder 5">
             <a:extLst>
               <a:ext uri="{FF2B5EF4-FFF2-40B4-BE49-F238E27FC236}">
-                <a16:creationId xmlns:a16="http://schemas.microsoft.com/office/drawing/2014/main" xmlns="" id="{0902A4B2-CB08-42CE-A814-FBDF345C2F43}"/>
+                <a16:creationId xmlns="" xmlns:a16="http://schemas.microsoft.com/office/drawing/2014/main" id="{0902A4B2-CB08-42CE-A814-FBDF345C2F43}"/>
               </a:ext>
             </a:extLst>
           </p:cNvPr>
@@ -10361,7 +10361,7 @@
           <p:cNvPr id="10" name="Title Placeholder 1">
             <a:extLst>
               <a:ext uri="{FF2B5EF4-FFF2-40B4-BE49-F238E27FC236}">
-                <a16:creationId xmlns:a16="http://schemas.microsoft.com/office/drawing/2014/main" xmlns="" id="{B770C392-3003-4C35-9625-BB041F8257BA}"/>
+                <a16:creationId xmlns="" xmlns:a16="http://schemas.microsoft.com/office/drawing/2014/main" id="{B770C392-3003-4C35-9625-BB041F8257BA}"/>
               </a:ext>
             </a:extLst>
           </p:cNvPr>
@@ -10400,7 +10400,7 @@
           <p:cNvPr id="11" name="Text Placeholder 2">
             <a:extLst>
               <a:ext uri="{FF2B5EF4-FFF2-40B4-BE49-F238E27FC236}">
-                <a16:creationId xmlns:a16="http://schemas.microsoft.com/office/drawing/2014/main" xmlns="" id="{90CBFB32-9F46-4F2F-8A54-9EE8BED27855}"/>
+                <a16:creationId xmlns="" xmlns:a16="http://schemas.microsoft.com/office/drawing/2014/main" id="{90CBFB32-9F46-4F2F-8A54-9EE8BED27855}"/>
               </a:ext>
             </a:extLst>
           </p:cNvPr>
@@ -10779,7 +10779,7 @@
   </p:txStyles>
   <p:extLst mod="1">
     <p:ext uri="{27BBF7A9-308A-43DC-89C8-2F10F3537804}">
-      <p15:sldGuideLst xmlns:p15="http://schemas.microsoft.com/office/powerpoint/2012/main" xmlns="">
+      <p15:sldGuideLst xmlns="" xmlns:p15="http://schemas.microsoft.com/office/powerpoint/2012/main">
         <p15:guide id="1" orient="horz" pos="2160">
           <p15:clr>
             <a:srgbClr val="F26B43"/>
@@ -10818,7 +10818,7 @@
           <p:cNvPr id="3" name="Subtitle 2">
             <a:extLst>
               <a:ext uri="{FF2B5EF4-FFF2-40B4-BE49-F238E27FC236}">
-                <a16:creationId xmlns:a16="http://schemas.microsoft.com/office/drawing/2014/main" xmlns="" id="{A004DC04-DA2A-41C0-8578-4B8D2F08EA7D}"/>
+                <a16:creationId xmlns="" xmlns:a16="http://schemas.microsoft.com/office/drawing/2014/main" id="{A004DC04-DA2A-41C0-8578-4B8D2F08EA7D}"/>
               </a:ext>
             </a:extLst>
           </p:cNvPr>
@@ -10858,7 +10858,7 @@
           <p:cNvPr id="2" name="Title 1">
             <a:extLst>
               <a:ext uri="{FF2B5EF4-FFF2-40B4-BE49-F238E27FC236}">
-                <a16:creationId xmlns:a16="http://schemas.microsoft.com/office/drawing/2014/main" xmlns="" id="{37F91798-9AD5-4209-8887-958029548481}"/>
+                <a16:creationId xmlns="" xmlns:a16="http://schemas.microsoft.com/office/drawing/2014/main" id="{37F91798-9AD5-4209-8887-958029548481}"/>
               </a:ext>
             </a:extLst>
           </p:cNvPr>
@@ -10940,7 +10940,7 @@
           <p:cNvPr id="9" name="Text Placeholder 8">
             <a:extLst>
               <a:ext uri="{FF2B5EF4-FFF2-40B4-BE49-F238E27FC236}">
-                <a16:creationId xmlns:a16="http://schemas.microsoft.com/office/drawing/2014/main" xmlns="" id="{FA396BB6-2053-4690-9672-BC528007D370}"/>
+                <a16:creationId xmlns="" xmlns:a16="http://schemas.microsoft.com/office/drawing/2014/main" id="{FA396BB6-2053-4690-9672-BC528007D370}"/>
               </a:ext>
             </a:extLst>
           </p:cNvPr>
@@ -10968,7 +10968,7 @@
           <p:cNvPr id="10" name="Text Placeholder 9">
             <a:extLst>
               <a:ext uri="{FF2B5EF4-FFF2-40B4-BE49-F238E27FC236}">
-                <a16:creationId xmlns:a16="http://schemas.microsoft.com/office/drawing/2014/main" xmlns="" id="{F585BC4C-0F13-4FD4-8F23-99FD46618370}"/>
+                <a16:creationId xmlns="" xmlns:a16="http://schemas.microsoft.com/office/drawing/2014/main" id="{F585BC4C-0F13-4FD4-8F23-99FD46618370}"/>
               </a:ext>
             </a:extLst>
           </p:cNvPr>
@@ -11866,28 +11866,28 @@
                 <a:gridCol w="1633855">
                   <a:extLst>
                     <a:ext uri="{9D8B030D-6E8A-4147-A177-3AD203B41FA5}">
-                      <a16:colId xmlns:a16="http://schemas.microsoft.com/office/drawing/2014/main" xmlns="" val="1927571903"/>
+                      <a16:colId xmlns="" xmlns:a16="http://schemas.microsoft.com/office/drawing/2014/main" val="1927571903"/>
                     </a:ext>
                   </a:extLst>
                 </a:gridCol>
                 <a:gridCol w="1594739">
                   <a:extLst>
                     <a:ext uri="{9D8B030D-6E8A-4147-A177-3AD203B41FA5}">
-                      <a16:colId xmlns:a16="http://schemas.microsoft.com/office/drawing/2014/main" xmlns="" val="4254615490"/>
+                      <a16:colId xmlns="" xmlns:a16="http://schemas.microsoft.com/office/drawing/2014/main" val="4254615490"/>
                     </a:ext>
                   </a:extLst>
                 </a:gridCol>
                 <a:gridCol w="748729">
                   <a:extLst>
                     <a:ext uri="{9D8B030D-6E8A-4147-A177-3AD203B41FA5}">
-                      <a16:colId xmlns:a16="http://schemas.microsoft.com/office/drawing/2014/main" xmlns="" val="678313436"/>
+                      <a16:colId xmlns="" xmlns:a16="http://schemas.microsoft.com/office/drawing/2014/main" val="678313436"/>
                     </a:ext>
                   </a:extLst>
                 </a:gridCol>
                 <a:gridCol w="2311718">
                   <a:extLst>
                     <a:ext uri="{9D8B030D-6E8A-4147-A177-3AD203B41FA5}">
-                      <a16:colId xmlns:a16="http://schemas.microsoft.com/office/drawing/2014/main" xmlns="" val="2682496645"/>
+                      <a16:colId xmlns="" xmlns:a16="http://schemas.microsoft.com/office/drawing/2014/main" val="2682496645"/>
                     </a:ext>
                   </a:extLst>
                 </a:gridCol>
@@ -11955,7 +11955,7 @@
                 </a:tc>
                 <a:extLst>
                   <a:ext uri="{0D108BD9-81ED-4DB2-BD59-A6C34878D82A}">
-                    <a16:rowId xmlns:a16="http://schemas.microsoft.com/office/drawing/2014/main" xmlns="" val="991613733"/>
+                    <a16:rowId xmlns="" xmlns:a16="http://schemas.microsoft.com/office/drawing/2014/main" val="991613733"/>
                   </a:ext>
                 </a:extLst>
               </a:tr>
@@ -12023,7 +12023,7 @@
                 </a:tc>
                 <a:extLst>
                   <a:ext uri="{0D108BD9-81ED-4DB2-BD59-A6C34878D82A}">
-                    <a16:rowId xmlns:a16="http://schemas.microsoft.com/office/drawing/2014/main" xmlns="" val="3826592249"/>
+                    <a16:rowId xmlns="" xmlns:a16="http://schemas.microsoft.com/office/drawing/2014/main" val="3826592249"/>
                   </a:ext>
                 </a:extLst>
               </a:tr>
@@ -12082,7 +12082,7 @@
                 </a:tc>
                 <a:extLst>
                   <a:ext uri="{0D108BD9-81ED-4DB2-BD59-A6C34878D82A}">
-                    <a16:rowId xmlns:a16="http://schemas.microsoft.com/office/drawing/2014/main" xmlns="" val="3634061056"/>
+                    <a16:rowId xmlns="" xmlns:a16="http://schemas.microsoft.com/office/drawing/2014/main" val="3634061056"/>
                   </a:ext>
                 </a:extLst>
               </a:tr>
@@ -12147,7 +12147,7 @@
                 </a:tc>
                 <a:extLst>
                   <a:ext uri="{0D108BD9-81ED-4DB2-BD59-A6C34878D82A}">
-                    <a16:rowId xmlns:a16="http://schemas.microsoft.com/office/drawing/2014/main" xmlns="" val="94778174"/>
+                    <a16:rowId xmlns="" xmlns:a16="http://schemas.microsoft.com/office/drawing/2014/main" val="94778174"/>
                   </a:ext>
                 </a:extLst>
               </a:tr>
@@ -12215,7 +12215,7 @@
                 </a:tc>
                 <a:extLst>
                   <a:ext uri="{0D108BD9-81ED-4DB2-BD59-A6C34878D82A}">
-                    <a16:rowId xmlns:a16="http://schemas.microsoft.com/office/drawing/2014/main" xmlns="" val="1377834696"/>
+                    <a16:rowId xmlns="" xmlns:a16="http://schemas.microsoft.com/office/drawing/2014/main" val="1377834696"/>
                   </a:ext>
                 </a:extLst>
               </a:tr>
@@ -29682,8 +29682,8 @@
               <a:buNone/>
             </a:pPr>
             <a:r>
-              <a:rPr lang="en-US" sz="11500" b="1" dirty="0" smtClean="0"/>
-              <a:t>#</a:t>
+              <a:rPr lang="en-US" sz="11500" b="1" smtClean="0"/>
+              <a:t>#JSCORE</a:t>
             </a:r>
             <a:endParaRPr lang="en-US" sz="11500" dirty="0"/>
           </a:p>
@@ -29785,7 +29785,7 @@
           <p:cNvPr id="8" name="Oval 7">
             <a:extLst>
               <a:ext uri="{FF2B5EF4-FFF2-40B4-BE49-F238E27FC236}">
-                <a16:creationId xmlns:a16="http://schemas.microsoft.com/office/drawing/2014/main" xmlns="" id="{EC850D8D-B775-4D85-946D-35E3FA1CA480}"/>
+                <a16:creationId xmlns="" xmlns:a16="http://schemas.microsoft.com/office/drawing/2014/main" id="{EC850D8D-B775-4D85-946D-35E3FA1CA480}"/>
               </a:ext>
             </a:extLst>
           </p:cNvPr>
@@ -29883,7 +29883,7 @@
           <p:cNvPr id="3" name="Text Placeholder 2">
             <a:extLst>
               <a:ext uri="{FF2B5EF4-FFF2-40B4-BE49-F238E27FC236}">
-                <a16:creationId xmlns:a16="http://schemas.microsoft.com/office/drawing/2014/main" xmlns="" id="{4A688711-BA59-4333-A01F-1AADD6578A57}"/>
+                <a16:creationId xmlns="" xmlns:a16="http://schemas.microsoft.com/office/drawing/2014/main" id="{4A688711-BA59-4333-A01F-1AADD6578A57}"/>
               </a:ext>
             </a:extLst>
           </p:cNvPr>
@@ -29908,7 +29908,7 @@
           <p:cNvPr id="4" name="Picture 3">
             <a:extLst>
               <a:ext uri="{FF2B5EF4-FFF2-40B4-BE49-F238E27FC236}">
-                <a16:creationId xmlns:a16="http://schemas.microsoft.com/office/drawing/2014/main" xmlns="" id="{91164FCD-7800-435E-869A-D8FA4DBBE20C}"/>
+                <a16:creationId xmlns="" xmlns:a16="http://schemas.microsoft.com/office/drawing/2014/main" id="{91164FCD-7800-435E-869A-D8FA4DBBE20C}"/>
               </a:ext>
             </a:extLst>
           </p:cNvPr>
@@ -29989,7 +29989,7 @@
           <p:cNvPr id="14" name="Text Placeholder 4">
             <a:extLst>
               <a:ext uri="{FF2B5EF4-FFF2-40B4-BE49-F238E27FC236}">
-                <a16:creationId xmlns:a16="http://schemas.microsoft.com/office/drawing/2014/main" xmlns="" id="{0E49D336-45B6-44D3-97C4-E28F8DEA2022}"/>
+                <a16:creationId xmlns="" xmlns:a16="http://schemas.microsoft.com/office/drawing/2014/main" id="{0E49D336-45B6-44D3-97C4-E28F8DEA2022}"/>
               </a:ext>
             </a:extLst>
           </p:cNvPr>
@@ -30137,7 +30137,7 @@
           <p:cNvPr id="9" name="Group 8">
             <a:extLst>
               <a:ext uri="{FF2B5EF4-FFF2-40B4-BE49-F238E27FC236}">
-                <a16:creationId xmlns:a16="http://schemas.microsoft.com/office/drawing/2014/main" xmlns="" id="{EBAFE522-EB7D-4931-A015-9A7E8A98517D}"/>
+                <a16:creationId xmlns="" xmlns:a16="http://schemas.microsoft.com/office/drawing/2014/main" id="{EBAFE522-EB7D-4931-A015-9A7E8A98517D}"/>
               </a:ext>
             </a:extLst>
           </p:cNvPr>
@@ -30157,7 +30157,7 @@
             <p:cNvPr id="10" name="Rounded Rectangle 10">
               <a:extLst>
                 <a:ext uri="{FF2B5EF4-FFF2-40B4-BE49-F238E27FC236}">
-                  <a16:creationId xmlns:a16="http://schemas.microsoft.com/office/drawing/2014/main" xmlns="" id="{18F78F23-3D09-4B63-8DF9-D49CFBB145EE}"/>
+                  <a16:creationId xmlns="" xmlns:a16="http://schemas.microsoft.com/office/drawing/2014/main" id="{18F78F23-3D09-4B63-8DF9-D49CFBB145EE}"/>
                 </a:ext>
               </a:extLst>
             </p:cNvPr>
@@ -30211,7 +30211,7 @@
             <p:cNvPr id="11" name="Rounded Rectangle 16">
               <a:extLst>
                 <a:ext uri="{FF2B5EF4-FFF2-40B4-BE49-F238E27FC236}">
-                  <a16:creationId xmlns:a16="http://schemas.microsoft.com/office/drawing/2014/main" xmlns="" id="{F12C06CE-2BBE-46C2-B718-813794C58DF9}"/>
+                  <a16:creationId xmlns="" xmlns:a16="http://schemas.microsoft.com/office/drawing/2014/main" id="{F12C06CE-2BBE-46C2-B718-813794C58DF9}"/>
                 </a:ext>
               </a:extLst>
             </p:cNvPr>
@@ -30271,7 +30271,7 @@
             <p:cNvPr id="12" name="Half Frame 11">
               <a:extLst>
                 <a:ext uri="{FF2B5EF4-FFF2-40B4-BE49-F238E27FC236}">
-                  <a16:creationId xmlns:a16="http://schemas.microsoft.com/office/drawing/2014/main" xmlns="" id="{66CDBB1E-AF3C-43FC-9F34-2DD691F81726}"/>
+                  <a16:creationId xmlns="" xmlns:a16="http://schemas.microsoft.com/office/drawing/2014/main" id="{66CDBB1E-AF3C-43FC-9F34-2DD691F81726}"/>
                 </a:ext>
               </a:extLst>
             </p:cNvPr>
@@ -30333,7 +30333,7 @@
           <p:cNvPr id="13" name="Picture 12">
             <a:extLst>
               <a:ext uri="{FF2B5EF4-FFF2-40B4-BE49-F238E27FC236}">
-                <a16:creationId xmlns:a16="http://schemas.microsoft.com/office/drawing/2014/main" xmlns="" id="{CCC3A316-993C-4741-8826-E104F27650A3}"/>
+                <a16:creationId xmlns="" xmlns:a16="http://schemas.microsoft.com/office/drawing/2014/main" id="{CCC3A316-993C-4741-8826-E104F27650A3}"/>
               </a:ext>
             </a:extLst>
           </p:cNvPr>
@@ -30368,7 +30368,7 @@
           <p:cNvPr id="15" name="Content Placeholder 4">
             <a:extLst>
               <a:ext uri="{FF2B5EF4-FFF2-40B4-BE49-F238E27FC236}">
-                <a16:creationId xmlns:a16="http://schemas.microsoft.com/office/drawing/2014/main" xmlns="" id="{373AC257-A0F4-4265-8C0F-3CB5C237A93D}"/>
+                <a16:creationId xmlns="" xmlns:a16="http://schemas.microsoft.com/office/drawing/2014/main" id="{373AC257-A0F4-4265-8C0F-3CB5C237A93D}"/>
               </a:ext>
             </a:extLst>
           </p:cNvPr>
@@ -30577,7 +30577,7 @@
           <p:cNvPr id="16" name="Content Placeholder 4">
             <a:extLst>
               <a:ext uri="{FF2B5EF4-FFF2-40B4-BE49-F238E27FC236}">
-                <a16:creationId xmlns:a16="http://schemas.microsoft.com/office/drawing/2014/main" xmlns="" id="{373AC257-A0F4-4265-8C0F-3CB5C237A93D}"/>
+                <a16:creationId xmlns="" xmlns:a16="http://schemas.microsoft.com/office/drawing/2014/main" id="{373AC257-A0F4-4265-8C0F-3CB5C237A93D}"/>
               </a:ext>
             </a:extLst>
           </p:cNvPr>
@@ -32400,7 +32400,7 @@
             <a:hlinkClick r:id="rId7"/>
             <a:extLst>
               <a:ext uri="{FF2B5EF4-FFF2-40B4-BE49-F238E27FC236}">
-                <a16:creationId xmlns:a16="http://schemas.microsoft.com/office/drawing/2014/main" xmlns="" id="{FF8B5863-FC71-441D-893C-E681B70BF35C}"/>
+                <a16:creationId xmlns="" xmlns:a16="http://schemas.microsoft.com/office/drawing/2014/main" id="{FF8B5863-FC71-441D-893C-E681B70BF35C}"/>
               </a:ext>
             </a:extLst>
           </p:cNvPr>
@@ -32437,7 +32437,7 @@
             <a:hlinkClick r:id="rId3"/>
             <a:extLst>
               <a:ext uri="{FF2B5EF4-FFF2-40B4-BE49-F238E27FC236}">
-                <a16:creationId xmlns:a16="http://schemas.microsoft.com/office/drawing/2014/main" xmlns="" id="{5AC70220-7037-4082-BB2D-BF1E99F91E0D}"/>
+                <a16:creationId xmlns="" xmlns:a16="http://schemas.microsoft.com/office/drawing/2014/main" id="{5AC70220-7037-4082-BB2D-BF1E99F91E0D}"/>
               </a:ext>
             </a:extLst>
           </p:cNvPr>
@@ -32474,7 +32474,7 @@
             <a:hlinkClick r:id="rId10" tooltip="Software University @ Facebook"/>
             <a:extLst>
               <a:ext uri="{FF2B5EF4-FFF2-40B4-BE49-F238E27FC236}">
-                <a16:creationId xmlns:a16="http://schemas.microsoft.com/office/drawing/2014/main" xmlns="" id="{7DE74804-3B64-4B79-BDD0-3E400F9EC1FD}"/>
+                <a16:creationId xmlns="" xmlns:a16="http://schemas.microsoft.com/office/drawing/2014/main" id="{7DE74804-3B64-4B79-BDD0-3E400F9EC1FD}"/>
               </a:ext>
             </a:extLst>
           </p:cNvPr>
@@ -32521,7 +32521,7 @@
             <a:hlinkClick r:id="rId6" tooltip="Software University Discussion Forum"/>
             <a:extLst>
               <a:ext uri="{FF2B5EF4-FFF2-40B4-BE49-F238E27FC236}">
-                <a16:creationId xmlns:a16="http://schemas.microsoft.com/office/drawing/2014/main" xmlns="" id="{E65F0011-8B8E-4A02-A422-9662ADE13CB5}"/>
+                <a16:creationId xmlns="" xmlns:a16="http://schemas.microsoft.com/office/drawing/2014/main" id="{E65F0011-8B8E-4A02-A422-9662ADE13CB5}"/>
               </a:ext>
             </a:extLst>
           </p:cNvPr>
@@ -32964,7 +32964,7 @@
           <p:cNvPr id="7" name="Text Placeholder 6">
             <a:extLst>
               <a:ext uri="{FF2B5EF4-FFF2-40B4-BE49-F238E27FC236}">
-                <a16:creationId xmlns:a16="http://schemas.microsoft.com/office/drawing/2014/main" xmlns="" id="{320B2856-CE5E-4934-BD1C-1D81E68E529A}"/>
+                <a16:creationId xmlns="" xmlns:a16="http://schemas.microsoft.com/office/drawing/2014/main" id="{320B2856-CE5E-4934-BD1C-1D81E68E529A}"/>
               </a:ext>
             </a:extLst>
           </p:cNvPr>
@@ -33366,7 +33366,7 @@
           <p:cNvPr id="3" name="Speech Bubble: Rectangle with Corners Rounded 2">
             <a:extLst>
               <a:ext uri="{FF2B5EF4-FFF2-40B4-BE49-F238E27FC236}">
-                <a16:creationId xmlns:a16="http://schemas.microsoft.com/office/drawing/2014/main" xmlns="" id="{8CE4F6D8-CF77-430A-9BAA-84FC26F903D8}"/>
+                <a16:creationId xmlns="" xmlns:a16="http://schemas.microsoft.com/office/drawing/2014/main" id="{8CE4F6D8-CF77-430A-9BAA-84FC26F903D8}"/>
               </a:ext>
             </a:extLst>
           </p:cNvPr>
@@ -33447,7 +33447,7 @@
           <p:cNvPr id="11" name="Speech Bubble: Rectangle with Corners Rounded 2">
             <a:extLst>
               <a:ext uri="{FF2B5EF4-FFF2-40B4-BE49-F238E27FC236}">
-                <a16:creationId xmlns:a16="http://schemas.microsoft.com/office/drawing/2014/main" xmlns="" id="{8CE4F6D8-CF77-430A-9BAA-84FC26F903D8}"/>
+                <a16:creationId xmlns="" xmlns:a16="http://schemas.microsoft.com/office/drawing/2014/main" id="{8CE4F6D8-CF77-430A-9BAA-84FC26F903D8}"/>
               </a:ext>
             </a:extLst>
           </p:cNvPr>
@@ -35187,7 +35187,7 @@
           <p:cNvPr id="10" name="Speech Bubble: Rectangle with Corners Rounded 2">
             <a:extLst>
               <a:ext uri="{FF2B5EF4-FFF2-40B4-BE49-F238E27FC236}">
-                <a16:creationId xmlns:a16="http://schemas.microsoft.com/office/drawing/2014/main" xmlns="" id="{8CE4F6D8-CF77-430A-9BAA-84FC26F903D8}"/>
+                <a16:creationId xmlns="" xmlns:a16="http://schemas.microsoft.com/office/drawing/2014/main" id="{8CE4F6D8-CF77-430A-9BAA-84FC26F903D8}"/>
               </a:ext>
             </a:extLst>
           </p:cNvPr>
@@ -35284,7 +35284,7 @@
           <p:cNvPr id="13" name="Speech Bubble: Rectangle with Corners Rounded 2">
             <a:extLst>
               <a:ext uri="{FF2B5EF4-FFF2-40B4-BE49-F238E27FC236}">
-                <a16:creationId xmlns:a16="http://schemas.microsoft.com/office/drawing/2014/main" xmlns="" id="{8CE4F6D8-CF77-430A-9BAA-84FC26F903D8}"/>
+                <a16:creationId xmlns="" xmlns:a16="http://schemas.microsoft.com/office/drawing/2014/main" id="{8CE4F6D8-CF77-430A-9BAA-84FC26F903D8}"/>
               </a:ext>
             </a:extLst>
           </p:cNvPr>
@@ -36456,7 +36456,7 @@
           <p:cNvPr id="10" name="Speech Bubble: Rectangle with Corners Rounded 2">
             <a:extLst>
               <a:ext uri="{FF2B5EF4-FFF2-40B4-BE49-F238E27FC236}">
-                <a16:creationId xmlns:a16="http://schemas.microsoft.com/office/drawing/2014/main" xmlns="" id="{8CE4F6D8-CF77-430A-9BAA-84FC26F903D8}"/>
+                <a16:creationId xmlns="" xmlns:a16="http://schemas.microsoft.com/office/drawing/2014/main" id="{8CE4F6D8-CF77-430A-9BAA-84FC26F903D8}"/>
               </a:ext>
             </a:extLst>
           </p:cNvPr>
@@ -39287,7 +39287,7 @@
   <a:extraClrSchemeLst/>
   <a:extLst>
     <a:ext uri="{05A4C25C-085E-4340-85A3-A5531E510DB2}">
-      <thm15:themeFamily xmlns:thm15="http://schemas.microsoft.com/office/thememl/2012/main" xmlns="" name="SoftUni3_1" id="{D61FAD9B-6E74-4E03-BFE4-B363D484F1DA}" vid="{7089C1A3-635B-4B03-A017-DAF10A3A396B}"/>
+      <thm15:themeFamily xmlns="" xmlns:thm15="http://schemas.microsoft.com/office/thememl/2012/main" name="SoftUni3_1" id="{D61FAD9B-6E74-4E03-BFE4-B363D484F1DA}" vid="{7089C1A3-635B-4B03-A017-DAF10A3A396B}"/>
     </a:ext>
   </a:extLst>
 </a:theme>
@@ -39582,7 +39582,7 @@
   <a:extraClrSchemeLst/>
   <a:extLst>
     <a:ext uri="{05A4C25C-085E-4340-85A3-A5531E510DB2}">
-      <thm15:themeFamily xmlns:thm15="http://schemas.microsoft.com/office/thememl/2012/main" xmlns="" name="Office Theme" id="{62F939B6-93AF-4DB8-9C6B-D6C7DFDC589F}" vid="{4A3C46E8-61CC-4603-A589-7422A47A8E4A}"/>
+      <thm15:themeFamily xmlns="" xmlns:thm15="http://schemas.microsoft.com/office/thememl/2012/main" name="Office Theme" id="{62F939B6-93AF-4DB8-9C6B-D6C7DFDC589F}" vid="{4A3C46E8-61CC-4603-A589-7422A47A8E4A}"/>
     </a:ext>
   </a:extLst>
 </a:theme>
@@ -39877,7 +39877,7 @@
   <a:extraClrSchemeLst/>
   <a:extLst>
     <a:ext uri="{05A4C25C-085E-4340-85A3-A5531E510DB2}">
-      <thm15:themeFamily xmlns:thm15="http://schemas.microsoft.com/office/thememl/2012/main" xmlns="" name="Office Theme" id="{62F939B6-93AF-4DB8-9C6B-D6C7DFDC589F}" vid="{4A3C46E8-61CC-4603-A589-7422A47A8E4A}"/>
+      <thm15:themeFamily xmlns="" xmlns:thm15="http://schemas.microsoft.com/office/thememl/2012/main" name="Office Theme" id="{62F939B6-93AF-4DB8-9C6B-D6C7DFDC589F}" vid="{4A3C46E8-61CC-4603-A589-7422A47A8E4A}"/>
     </a:ext>
   </a:extLst>
 </a:theme>

</xml_diff>